<commit_message>
mise à jour du projet, toutes les fonctions à jour, les fonctions de recherche et spécifiques à DossierReservation à améliorer, et implementer les triggers + mises a jour (prix, age)
</commit_message>
<xml_diff>
--- a/Projet2_BoVoyage_VL-AP.pptx
+++ b/Projet2_BoVoyage_VL-AP.pptx
@@ -6616,7 +6616,7 @@
         <p:spPr>
           <a:xfrm>
             <a:off x="563823" y="354183"/>
-            <a:ext cx="1948562" cy="743922"/>
+            <a:ext cx="1948562" cy="1395510"/>
           </a:xfrm>
           <a:prstGeom prst="rect">
             <a:avLst/>
@@ -6633,6 +6633,15 @@
               <a:rPr lang="fr-FR" dirty="0"/>
               <a:t>CLES / LIENS ENTRE TABLES</a:t>
             </a:r>
+          </a:p>
+          <a:p>
+            <a:r>
+              <a:rPr lang="fr-FR" dirty="0">
+                <a:sym typeface="Wingdings" panose="05000000000000000000" pitchFamily="2" charset="2"/>
+              </a:rPr>
+              <a:t> Version intermédiaire</a:t>
+            </a:r>
+            <a:endParaRPr lang="fr-FR" dirty="0"/>
           </a:p>
         </p:txBody>
       </p:sp>
@@ -7063,8 +7072,8 @@
         </p:nvSpPr>
         <p:spPr>
           <a:xfrm>
-            <a:off x="563823" y="354183"/>
-            <a:ext cx="1948562" cy="418128"/>
+            <a:off x="563822" y="354183"/>
+            <a:ext cx="2496877" cy="743922"/>
           </a:xfrm>
           <a:prstGeom prst="rect">
             <a:avLst/>
@@ -7081,6 +7090,21 @@
               <a:rPr lang="fr-FR" dirty="0"/>
               <a:t>TABLES SQL</a:t>
             </a:r>
+          </a:p>
+          <a:p>
+            <a:r>
+              <a:rPr lang="fr-FR" dirty="0">
+                <a:sym typeface="Wingdings" panose="05000000000000000000" pitchFamily="2" charset="2"/>
+              </a:rPr>
+              <a:t> Version </a:t>
+            </a:r>
+            <a:r>
+              <a:rPr lang="fr-FR" dirty="0" err="1">
+                <a:sym typeface="Wingdings" panose="05000000000000000000" pitchFamily="2" charset="2"/>
+              </a:rPr>
+              <a:t>SQLisable</a:t>
+            </a:r>
+            <a:endParaRPr lang="fr-FR" dirty="0"/>
           </a:p>
         </p:txBody>
       </p:sp>
@@ -7099,72 +7123,65 @@
           <p:nvPr>
             <p:extLst>
               <p:ext uri="{D42A27DB-BD31-4B8C-83A1-F6EECF244321}">
-                <p14:modId xmlns:p14="http://schemas.microsoft.com/office/powerpoint/2010/main" val="3785793152"/>
+                <p14:modId xmlns:p14="http://schemas.microsoft.com/office/powerpoint/2010/main" val="3515914146"/>
               </p:ext>
             </p:extLst>
           </p:nvPr>
         </p:nvGraphicFramePr>
         <p:xfrm>
-          <a:off x="827435" y="7733370"/>
-          <a:ext cx="10882416" cy="1066800"/>
+          <a:off x="827435" y="7713086"/>
+          <a:ext cx="10689449" cy="1280160"/>
         </p:xfrm>
         <a:graphic>
           <a:graphicData uri="http://schemas.openxmlformats.org/drawingml/2006/table">
             <a:tbl>
               <a:tblPr firstRow="1" bandRow="1">
-                <a:tableStyleId>{5C22544A-7EE6-4342-B048-85BDC9FD1C3A}</a:tableStyleId>
+                <a:tableStyleId>{21E4AEA4-8DFA-4A89-87EB-49C32662AFE0}</a:tableStyleId>
               </a:tblPr>
               <a:tblGrid>
-                <a:gridCol w="1853066">
+                <a:gridCol w="1137843">
                   <a:extLst>
                     <a:ext uri="{9D8B030D-6E8A-4147-A177-3AD203B41FA5}">
                       <a16:colId xmlns:a16="http://schemas.microsoft.com/office/drawing/2014/main" val="20000"/>
                     </a:ext>
                   </a:extLst>
                 </a:gridCol>
-                <a:gridCol w="1399901">
-                  <a:extLst>
-                    <a:ext uri="{9D8B030D-6E8A-4147-A177-3AD203B41FA5}">
-                      <a16:colId xmlns:a16="http://schemas.microsoft.com/office/drawing/2014/main" val="3185087644"/>
-                    </a:ext>
-                  </a:extLst>
-                </a:gridCol>
-                <a:gridCol w="1726275">
+                <a:gridCol w="1269241">
                   <a:extLst>
                     <a:ext uri="{9D8B030D-6E8A-4147-A177-3AD203B41FA5}">
                       <a16:colId xmlns:a16="http://schemas.microsoft.com/office/drawing/2014/main" val="1144687422"/>
                     </a:ext>
                   </a:extLst>
                 </a:gridCol>
-                <a:gridCol w="1231912">
+                <a:gridCol w="1351129">
                   <a:extLst>
                     <a:ext uri="{9D8B030D-6E8A-4147-A177-3AD203B41FA5}">
                       <a16:colId xmlns:a16="http://schemas.microsoft.com/office/drawing/2014/main" val="2205830276"/>
                     </a:ext>
                   </a:extLst>
                 </a:gridCol>
-                <a:gridCol w="947532">
+                <a:gridCol w="1446662">
                   <a:extLst>
                     <a:ext uri="{9D8B030D-6E8A-4147-A177-3AD203B41FA5}">
                       <a16:colId xmlns:a16="http://schemas.microsoft.com/office/drawing/2014/main" val="20003"/>
                     </a:ext>
                   </a:extLst>
                 </a:gridCol>
-                <a:gridCol w="1320305">
+                <a:gridCol w="1269242">
                   <a:extLst>
                     <a:ext uri="{9D8B030D-6E8A-4147-A177-3AD203B41FA5}">
                       <a16:colId xmlns:a16="http://schemas.microsoft.com/office/drawing/2014/main" val="20004"/>
                     </a:ext>
                   </a:extLst>
                 </a:gridCol>
-                <a:gridCol w="1245912">
+                <a:gridCol w="1269242">
                   <a:extLst>
                     <a:ext uri="{9D8B030D-6E8A-4147-A177-3AD203B41FA5}">
                       <a16:colId xmlns:a16="http://schemas.microsoft.com/office/drawing/2014/main" val="20005"/>
                     </a:ext>
                   </a:extLst>
                 </a:gridCol>
-                <a:gridCol w="1157513">
+                <a:gridCol w="2946090">
                   <a:extLst>
                     <a:ext uri="{9D8B030D-6E8A-4147-A177-3AD203B41FA5}">
                       <a16:colId xmlns:a16="http://schemas.microsoft.com/office/drawing/2014/main" val="20006"/>
@@ -7173,27 +7190,16 @@
                 </a:gridCol>
               </a:tblGrid>
               <a:tr h="264190">
-                <a:tc gridSpan="8">
+                <a:tc gridSpan="7">
                   <a:txBody>
                     <a:bodyPr/>
                     <a:lstStyle/>
                     <a:p>
                       <a:pPr algn="ctr"/>
                       <a:r>
-                        <a:rPr lang="fr-FR" sz="1600" dirty="0" err="1"/>
-                        <a:t>DossierReservation</a:t>
-                      </a:r>
-                      <a:endParaRPr lang="fr-FR" sz="1600" dirty="0"/>
-                    </a:p>
-                  </a:txBody>
-                  <a:tcPr/>
-                </a:tc>
-                <a:tc hMerge="1">
-                  <a:txBody>
-                    <a:bodyPr/>
-                    <a:lstStyle/>
-                    <a:p>
-                      <a:endParaRPr lang="fr-FR"/>
+                        <a:rPr lang="fr-FR" sz="1600" dirty="0"/>
+                        <a:t>Dossiers</a:t>
+                      </a:r>
                     </a:p>
                   </a:txBody>
                   <a:tcPr/>
@@ -7271,188 +7277,143 @@
                     <a:lstStyle/>
                     <a:p>
                       <a:r>
-                        <a:rPr lang="fr-FR" sz="1200" b="1" dirty="0" err="1"/>
-                        <a:t>ID_DossierReservation</a:t>
+                        <a:rPr lang="fr-FR" sz="1200" dirty="0" err="1"/>
+                        <a:t>ID_Dossier</a:t>
+                      </a:r>
+                      <a:endParaRPr lang="fr-FR" sz="1200" dirty="0"/>
+                    </a:p>
+                    <a:p>
+                      <a:r>
+                        <a:rPr lang="fr-FR" sz="1200" dirty="0"/>
+                        <a:t>(</a:t>
+                      </a:r>
+                      <a:r>
+                        <a:rPr lang="fr-FR" sz="1200" dirty="0" err="1"/>
+                        <a:t>identity</a:t>
+                      </a:r>
+                      <a:r>
+                        <a:rPr lang="fr-FR" sz="1200" dirty="0"/>
+                        <a:t>)</a:t>
                       </a:r>
                       <a:endParaRPr lang="fr-FR" sz="1200" b="1" dirty="0"/>
                     </a:p>
-                    <a:p>
-                      <a:r>
-                        <a:rPr lang="fr-FR" sz="1200" b="1" dirty="0"/>
+                  </a:txBody>
+                  <a:tcPr/>
+                </a:tc>
+                <a:tc>
+                  <a:txBody>
+                    <a:bodyPr/>
+                    <a:lstStyle/>
+                    <a:p>
+                      <a:r>
+                        <a:rPr lang="fr-FR" sz="1200" dirty="0" err="1"/>
+                        <a:t>numeroCB</a:t>
+                      </a:r>
+                      <a:endParaRPr lang="fr-FR" sz="1200" dirty="0"/>
+                    </a:p>
+                    <a:p>
+                      <a:r>
+                        <a:rPr lang="fr-FR" sz="1200" dirty="0"/>
+                        <a:t>(nvarchar16)</a:t>
+                      </a:r>
+                      <a:endParaRPr lang="fr-FR" sz="1200" b="1" dirty="0"/>
+                    </a:p>
+                  </a:txBody>
+                  <a:tcPr/>
+                </a:tc>
+                <a:tc>
+                  <a:txBody>
+                    <a:bodyPr/>
+                    <a:lstStyle/>
+                    <a:p>
+                      <a:r>
+                        <a:rPr lang="fr-FR" sz="1200" dirty="0"/>
+                        <a:t>/ </a:t>
+                      </a:r>
+                      <a:r>
+                        <a:rPr lang="fr-FR" sz="1200" dirty="0" err="1"/>
+                        <a:t>prixTotal</a:t>
+                      </a:r>
+                      <a:endParaRPr lang="fr-FR" sz="1200" dirty="0"/>
+                    </a:p>
+                    <a:p>
+                      <a:r>
+                        <a:rPr lang="fr-FR" sz="1200" dirty="0"/>
                         <a:t>(</a:t>
                       </a:r>
                       <a:r>
-                        <a:rPr lang="fr-FR" sz="1200" b="1" dirty="0" err="1"/>
-                        <a:t>identity</a:t>
-                      </a:r>
-                      <a:r>
-                        <a:rPr lang="fr-FR" sz="1200" b="1" dirty="0"/>
+                        <a:rPr lang="fr-FR" sz="1200" dirty="0" err="1"/>
+                        <a:t>currency</a:t>
+                      </a:r>
+                      <a:r>
+                        <a:rPr lang="fr-FR" sz="1200" dirty="0"/>
+                        <a:t>?)</a:t>
+                      </a:r>
+                      <a:endParaRPr lang="fr-FR" sz="1200" b="1" dirty="0"/>
+                    </a:p>
+                  </a:txBody>
+                  <a:tcPr/>
+                </a:tc>
+                <a:tc>
+                  <a:txBody>
+                    <a:bodyPr/>
+                    <a:lstStyle/>
+                    <a:p>
+                      <a:r>
+                        <a:rPr lang="fr-FR" sz="1200" dirty="0" err="1"/>
+                        <a:t>RaisonAnnulDoss</a:t>
+                      </a:r>
+                      <a:endParaRPr lang="fr-FR" sz="1200" dirty="0"/>
+                    </a:p>
+                    <a:p>
+                      <a:r>
+                        <a:rPr lang="fr-FR" sz="1200" dirty="0"/>
+                        <a:t>(</a:t>
+                      </a:r>
+                      <a:r>
+                        <a:rPr lang="fr-FR" sz="1200" dirty="0" err="1"/>
+                        <a:t>enum</a:t>
+                      </a:r>
+                      <a:r>
+                        <a:rPr lang="fr-FR" sz="1200" dirty="0"/>
                         <a:t>)</a:t>
                       </a:r>
-                    </a:p>
-                  </a:txBody>
-                  <a:tcPr/>
-                </a:tc>
-                <a:tc>
-                  <a:txBody>
-                    <a:bodyPr/>
-                    <a:lstStyle/>
-                    <a:p>
-                      <a:r>
-                        <a:rPr lang="fr-FR" sz="1200" b="1" dirty="0" err="1"/>
-                        <a:t>numeroUnique</a:t>
-                      </a:r>
                       <a:endParaRPr lang="fr-FR" sz="1200" b="1" dirty="0"/>
                     </a:p>
                     <a:p>
-                      <a:r>
-                        <a:rPr lang="fr-FR" sz="1200" b="1" dirty="0"/>
+                      <a:endParaRPr lang="fr-FR" sz="1200" b="1" dirty="0"/>
+                    </a:p>
+                  </a:txBody>
+                  <a:tcPr/>
+                </a:tc>
+                <a:tc>
+                  <a:txBody>
+                    <a:bodyPr/>
+                    <a:lstStyle/>
+                    <a:p>
+                      <a:r>
+                        <a:rPr lang="fr-FR" sz="1200" dirty="0" err="1"/>
+                        <a:t>EtatDossResa</a:t>
+                      </a:r>
+                      <a:endParaRPr lang="fr-FR" sz="1200" dirty="0"/>
+                    </a:p>
+                    <a:p>
+                      <a:r>
+                        <a:rPr lang="fr-FR" sz="1200" dirty="0"/>
                         <a:t>(</a:t>
                       </a:r>
                       <a:r>
-                        <a:rPr lang="fr-FR" sz="1200" b="1" dirty="0" err="1"/>
-                        <a:t>int</a:t>
-                      </a:r>
-                      <a:r>
-                        <a:rPr lang="fr-FR" sz="1200" b="1" dirty="0"/>
+                        <a:rPr lang="fr-FR" sz="1200" dirty="0" err="1"/>
+                        <a:t>enum</a:t>
+                      </a:r>
+                      <a:r>
+                        <a:rPr lang="fr-FR" sz="1200" dirty="0"/>
                         <a:t>)</a:t>
                       </a:r>
-                    </a:p>
-                  </a:txBody>
-                  <a:tcPr/>
-                </a:tc>
-                <a:tc>
-                  <a:txBody>
-                    <a:bodyPr/>
-                    <a:lstStyle/>
-                    <a:p>
-                      <a:r>
-                        <a:rPr lang="fr-FR" sz="1200" b="1" dirty="0" err="1"/>
-                        <a:t>numeroCarteBancaire</a:t>
-                      </a:r>
                       <a:endParaRPr lang="fr-FR" sz="1200" b="1" dirty="0"/>
                     </a:p>
                     <a:p>
-                      <a:r>
-                        <a:rPr lang="fr-FR" sz="1200" b="1" dirty="0"/>
-                        <a:t>(nvarchar16)</a:t>
-                      </a:r>
-                    </a:p>
-                  </a:txBody>
-                  <a:tcPr/>
-                </a:tc>
-                <a:tc>
-                  <a:txBody>
-                    <a:bodyPr/>
-                    <a:lstStyle/>
-                    <a:p>
-                      <a:r>
-                        <a:rPr lang="fr-FR" sz="1200" b="1" dirty="0"/>
-                        <a:t>/ </a:t>
-                      </a:r>
-                      <a:r>
-                        <a:rPr lang="fr-FR" sz="1200" b="1" dirty="0" err="1"/>
-                        <a:t>prixTotal</a:t>
-                      </a:r>
                       <a:endParaRPr lang="fr-FR" sz="1200" b="1" dirty="0"/>
-                    </a:p>
-                    <a:p>
-                      <a:r>
-                        <a:rPr lang="fr-FR" sz="1200" b="1" dirty="0"/>
-                        <a:t>(</a:t>
-                      </a:r>
-                      <a:r>
-                        <a:rPr lang="fr-FR" sz="1200" b="1" dirty="0" err="1"/>
-                        <a:t>currency</a:t>
-                      </a:r>
-                      <a:r>
-                        <a:rPr lang="fr-FR" sz="1200" b="1" dirty="0"/>
-                        <a:t>?)</a:t>
-                      </a:r>
-                    </a:p>
-                  </a:txBody>
-                  <a:tcPr/>
-                </a:tc>
-                <a:tc>
-                  <a:txBody>
-                    <a:bodyPr/>
-                    <a:lstStyle/>
-                    <a:p>
-                      <a:r>
-                        <a:rPr lang="fr-FR" sz="1200" b="1" dirty="0" err="1"/>
-                        <a:t>ID_Client</a:t>
-                      </a:r>
-                      <a:endParaRPr lang="fr-FR" sz="1200" b="1" dirty="0"/>
-                    </a:p>
-                    <a:p>
-                      <a:r>
-                        <a:rPr lang="fr-FR" sz="1200" b="1" dirty="0"/>
-                        <a:t>(</a:t>
-                      </a:r>
-                      <a:r>
-                        <a:rPr lang="fr-FR" sz="1200" b="1" dirty="0" err="1"/>
-                        <a:t>int</a:t>
-                      </a:r>
-                      <a:r>
-                        <a:rPr lang="fr-FR" sz="1200" b="1" dirty="0"/>
-                        <a:t>)</a:t>
-                      </a:r>
-                    </a:p>
-                  </a:txBody>
-                  <a:tcPr/>
-                </a:tc>
-                <a:tc>
-                  <a:txBody>
-                    <a:bodyPr/>
-                    <a:lstStyle/>
-                    <a:p>
-                      <a:r>
-                        <a:rPr lang="fr-FR" sz="1200" b="1" dirty="0" err="1"/>
-                        <a:t>RaisAnnDoss</a:t>
-                      </a:r>
-                      <a:endParaRPr lang="fr-FR" sz="1200" b="1" dirty="0"/>
-                    </a:p>
-                    <a:p>
-                      <a:r>
-                        <a:rPr lang="fr-FR" sz="1200" b="1" dirty="0"/>
-                        <a:t>(</a:t>
-                      </a:r>
-                      <a:r>
-                        <a:rPr lang="fr-FR" sz="1200" b="1" dirty="0" err="1"/>
-                        <a:t>enum</a:t>
-                      </a:r>
-                      <a:r>
-                        <a:rPr lang="fr-FR" sz="1200" b="1" dirty="0"/>
-                        <a:t>)</a:t>
-                      </a:r>
-                    </a:p>
-                  </a:txBody>
-                  <a:tcPr/>
-                </a:tc>
-                <a:tc>
-                  <a:txBody>
-                    <a:bodyPr/>
-                    <a:lstStyle/>
-                    <a:p>
-                      <a:r>
-                        <a:rPr lang="fr-FR" sz="1200" b="1" dirty="0" err="1"/>
-                        <a:t>EtatDossRes</a:t>
-                      </a:r>
-                      <a:endParaRPr lang="fr-FR" sz="1200" b="1" dirty="0"/>
-                    </a:p>
-                    <a:p>
-                      <a:r>
-                        <a:rPr lang="fr-FR" sz="1200" b="1" dirty="0"/>
-                        <a:t>(</a:t>
-                      </a:r>
-                      <a:r>
-                        <a:rPr lang="fr-FR" sz="1200" b="1" dirty="0" err="1"/>
-                        <a:t>enum</a:t>
-                      </a:r>
-                      <a:r>
-                        <a:rPr lang="fr-FR" sz="1200" b="1" dirty="0"/>
-                        <a:t>)</a:t>
-                      </a:r>
                     </a:p>
                   </a:txBody>
                   <a:tcPr/>
@@ -7480,10 +7441,10 @@
                         <a:defRPr/>
                       </a:pPr>
                       <a:r>
-                        <a:rPr lang="fr-FR" sz="1200" b="1" dirty="0" err="1"/>
+                        <a:rPr lang="fr-FR" sz="1200" dirty="0" err="1"/>
                         <a:t>ID_Voyage</a:t>
                       </a:r>
-                      <a:endParaRPr lang="fr-FR" sz="1200" b="1" dirty="0"/>
+                      <a:endParaRPr lang="fr-FR" sz="1200" dirty="0"/>
                     </a:p>
                     <a:p>
                       <a:pPr marL="0" marR="0" lvl="0" indent="0" algn="l" defTabSz="1280160" rtl="0" eaLnBrk="1" fontAlgn="auto" latinLnBrk="0" hangingPunct="1">
@@ -7504,17 +7465,78 @@
                         <a:defRPr/>
                       </a:pPr>
                       <a:r>
-                        <a:rPr lang="fr-FR" sz="1200" b="1" dirty="0"/>
+                        <a:rPr lang="fr-FR" sz="1200" dirty="0"/>
                         <a:t>(</a:t>
                       </a:r>
                       <a:r>
-                        <a:rPr lang="fr-FR" sz="1200" b="1" dirty="0" err="1"/>
+                        <a:rPr lang="fr-FR" sz="1200" dirty="0" err="1"/>
                         <a:t>int</a:t>
                       </a:r>
                       <a:r>
-                        <a:rPr lang="fr-FR" sz="1200" b="1" dirty="0"/>
+                        <a:rPr lang="fr-FR" sz="1200" dirty="0"/>
                         <a:t>)</a:t>
                       </a:r>
+                      <a:endParaRPr lang="fr-FR" sz="1200" b="1" dirty="0"/>
+                    </a:p>
+                    <a:p>
+                      <a:endParaRPr lang="fr-FR" sz="1200" b="1" dirty="0"/>
+                    </a:p>
+                  </a:txBody>
+                  <a:tcPr/>
+                </a:tc>
+                <a:tc>
+                  <a:txBody>
+                    <a:bodyPr/>
+                    <a:lstStyle/>
+                    <a:p>
+                      <a:r>
+                        <a:rPr lang="fr-FR" sz="1200" dirty="0" err="1"/>
+                        <a:t>ID_Client</a:t>
+                      </a:r>
+                      <a:endParaRPr lang="fr-FR" sz="1200" dirty="0"/>
+                    </a:p>
+                    <a:p>
+                      <a:r>
+                        <a:rPr lang="fr-FR" sz="1200" dirty="0"/>
+                        <a:t>(</a:t>
+                      </a:r>
+                      <a:r>
+                        <a:rPr lang="fr-FR" sz="1200" dirty="0" err="1"/>
+                        <a:t>int</a:t>
+                      </a:r>
+                      <a:r>
+                        <a:rPr lang="fr-FR" sz="1200" dirty="0"/>
+                        <a:t>) ‘</a:t>
+                      </a:r>
+                      <a:r>
+                        <a:rPr lang="fr-FR" sz="1200" dirty="0" err="1"/>
+                        <a:t>FK_IDParticipant</a:t>
+                      </a:r>
+                      <a:r>
+                        <a:rPr lang="fr-FR" sz="1200" dirty="0"/>
+                        <a:t> trigger Client = 1’</a:t>
+                      </a:r>
+                      <a:endParaRPr lang="fr-FR" sz="1200" b="1" dirty="0"/>
+                    </a:p>
+                    <a:p>
+                      <a:pPr marL="0" marR="0" lvl="0" indent="0" algn="l" defTabSz="1280160" rtl="0" eaLnBrk="1" fontAlgn="auto" latinLnBrk="0" hangingPunct="1">
+                        <a:lnSpc>
+                          <a:spcPct val="100000"/>
+                        </a:lnSpc>
+                        <a:spcBef>
+                          <a:spcPts val="0"/>
+                        </a:spcBef>
+                        <a:spcAft>
+                          <a:spcPts val="0"/>
+                        </a:spcAft>
+                        <a:buClrTx/>
+                        <a:buSzTx/>
+                        <a:buFontTx/>
+                        <a:buNone/>
+                        <a:tabLst/>
+                        <a:defRPr/>
+                      </a:pPr>
+                      <a:endParaRPr lang="fr-FR" sz="1200" b="1" dirty="0"/>
                     </a:p>
                   </a:txBody>
                   <a:tcPr/>
@@ -7531,6 +7553,40 @@
                     <a:bodyPr/>
                     <a:lstStyle/>
                     <a:p>
+                      <a:pPr marL="0" marR="0" lvl="0" indent="0" algn="ctr" defTabSz="1280160" rtl="0" eaLnBrk="1" fontAlgn="auto" latinLnBrk="0" hangingPunct="1">
+                        <a:lnSpc>
+                          <a:spcPct val="100000"/>
+                        </a:lnSpc>
+                        <a:spcBef>
+                          <a:spcPts val="0"/>
+                        </a:spcBef>
+                        <a:spcAft>
+                          <a:spcPts val="0"/>
+                        </a:spcAft>
+                        <a:buClrTx/>
+                        <a:buSzTx/>
+                        <a:buFontTx/>
+                        <a:buNone/>
+                        <a:tabLst/>
+                        <a:defRPr/>
+                      </a:pPr>
+                      <a:r>
+                        <a:rPr lang="fr-FR" sz="1400" b="1" dirty="0">
+                          <a:solidFill>
+                            <a:srgbClr val="00B050"/>
+                          </a:solidFill>
+                        </a:rPr>
+                        <a:t>PK</a:t>
+                      </a:r>
+                    </a:p>
+                  </a:txBody>
+                  <a:tcPr/>
+                </a:tc>
+                <a:tc>
+                  <a:txBody>
+                    <a:bodyPr/>
+                    <a:lstStyle/>
+                    <a:p>
                       <a:endParaRPr lang="fr-FR" sz="1200" dirty="0"/>
                     </a:p>
                   </a:txBody>
@@ -7541,6 +7597,40 @@
                     <a:bodyPr/>
                     <a:lstStyle/>
                     <a:p>
+                      <a:pPr marL="0" marR="0" lvl="0" indent="0" algn="l" defTabSz="1280160" rtl="0" eaLnBrk="1" fontAlgn="auto" latinLnBrk="0" hangingPunct="1">
+                        <a:lnSpc>
+                          <a:spcPct val="100000"/>
+                        </a:lnSpc>
+                        <a:spcBef>
+                          <a:spcPts val="0"/>
+                        </a:spcBef>
+                        <a:spcAft>
+                          <a:spcPts val="0"/>
+                        </a:spcAft>
+                        <a:buClrTx/>
+                        <a:buSzTx/>
+                        <a:buFontTx/>
+                        <a:buNone/>
+                        <a:tabLst/>
+                        <a:defRPr/>
+                      </a:pPr>
+                      <a:r>
+                        <a:rPr lang="fr-FR" sz="1200" b="1" dirty="0">
+                          <a:solidFill>
+                            <a:srgbClr val="7030A0"/>
+                          </a:solidFill>
+                        </a:rPr>
+                        <a:t>À Calculer</a:t>
+                      </a:r>
+                    </a:p>
+                  </a:txBody>
+                  <a:tcPr/>
+                </a:tc>
+                <a:tc>
+                  <a:txBody>
+                    <a:bodyPr/>
+                    <a:lstStyle/>
+                    <a:p>
                       <a:endParaRPr lang="fr-FR" sz="1200" dirty="0"/>
                     </a:p>
                   </a:txBody>
@@ -7561,47 +7651,34 @@
                     <a:bodyPr/>
                     <a:lstStyle/>
                     <a:p>
-                      <a:endParaRPr lang="fr-FR" sz="1200" dirty="0"/>
-                    </a:p>
-                  </a:txBody>
-                  <a:tcPr/>
-                </a:tc>
-                <a:tc>
-                  <a:txBody>
-                    <a:bodyPr/>
-                    <a:lstStyle/>
-                    <a:p>
-                      <a:endParaRPr lang="fr-FR" sz="1200" dirty="0"/>
-                    </a:p>
-                  </a:txBody>
-                  <a:tcPr/>
-                </a:tc>
-                <a:tc>
-                  <a:txBody>
-                    <a:bodyPr/>
-                    <a:lstStyle/>
-                    <a:p>
-                      <a:endParaRPr lang="fr-FR" sz="1200" dirty="0"/>
-                    </a:p>
-                  </a:txBody>
-                  <a:tcPr/>
-                </a:tc>
-                <a:tc>
-                  <a:txBody>
-                    <a:bodyPr/>
-                    <a:lstStyle/>
-                    <a:p>
-                      <a:endParaRPr lang="fr-FR" sz="1200" dirty="0"/>
-                    </a:p>
-                  </a:txBody>
-                  <a:tcPr/>
-                </a:tc>
-                <a:tc>
-                  <a:txBody>
-                    <a:bodyPr/>
-                    <a:lstStyle/>
-                    <a:p>
-                      <a:endParaRPr lang="fr-FR" sz="1200" dirty="0"/>
+                      <a:pPr algn="ctr"/>
+                      <a:r>
+                        <a:rPr lang="fr-FR" sz="1400" b="1" dirty="0">
+                          <a:solidFill>
+                            <a:srgbClr val="C00000"/>
+                          </a:solidFill>
+                        </a:rPr>
+                        <a:t>FK</a:t>
+                      </a:r>
+                    </a:p>
+                  </a:txBody>
+                  <a:tcPr/>
+                </a:tc>
+                <a:tc>
+                  <a:txBody>
+                    <a:bodyPr/>
+                    <a:lstStyle/>
+                    <a:p>
+                      <a:pPr algn="ctr"/>
+                      <a:r>
+                        <a:rPr lang="fr-FR" sz="1400" b="1" dirty="0">
+                          <a:solidFill>
+                            <a:srgbClr val="C00000"/>
+                          </a:solidFill>
+                        </a:rPr>
+                        <a:t>FK</a:t>
+                      </a:r>
+                      <a:endParaRPr lang="fr-FR" sz="1400" dirty="0"/>
                     </a:p>
                   </a:txBody>
                   <a:tcPr/>
@@ -7631,20 +7708,20 @@
           <p:nvPr>
             <p:extLst>
               <p:ext uri="{D42A27DB-BD31-4B8C-83A1-F6EECF244321}">
-                <p14:modId xmlns:p14="http://schemas.microsoft.com/office/powerpoint/2010/main" val="2101737289"/>
+                <p14:modId xmlns:p14="http://schemas.microsoft.com/office/powerpoint/2010/main" val="2483129306"/>
               </p:ext>
             </p:extLst>
           </p:nvPr>
         </p:nvGraphicFramePr>
         <p:xfrm>
           <a:off x="617368" y="6140178"/>
-          <a:ext cx="11092483" cy="1066800"/>
+          <a:ext cx="11092483" cy="1280160"/>
         </p:xfrm>
         <a:graphic>
           <a:graphicData uri="http://schemas.openxmlformats.org/drawingml/2006/table">
             <a:tbl>
               <a:tblPr firstRow="1" bandRow="1">
-                <a:tableStyleId>{5C22544A-7EE6-4342-B048-85BDC9FD1C3A}</a:tableStyleId>
+                <a:tableStyleId>{93296810-A885-4BE3-A3E7-6D5BEEA58F35}</a:tableStyleId>
               </a:tblPr>
               <a:tblGrid>
                 <a:gridCol w="1252749">
@@ -7727,7 +7804,7 @@
                       <a:pPr algn="ctr"/>
                       <a:r>
                         <a:rPr lang="fr-FR" sz="1600" dirty="0"/>
-                        <a:t>Participant</a:t>
+                        <a:t>Participants</a:t>
                       </a:r>
                     </a:p>
                   </a:txBody>
@@ -7836,207 +7913,217 @@
                     <a:lstStyle/>
                     <a:p>
                       <a:r>
-                        <a:rPr lang="fr-FR" sz="1200" b="1" dirty="0" err="1"/>
+                        <a:rPr lang="fr-FR" sz="1200" dirty="0" err="1"/>
                         <a:t>ID_Participant</a:t>
                       </a:r>
+                      <a:endParaRPr lang="fr-FR" sz="1200" dirty="0"/>
+                    </a:p>
+                    <a:p>
+                      <a:r>
+                        <a:rPr lang="fr-FR" sz="1200" dirty="0"/>
+                        <a:t>(</a:t>
+                      </a:r>
+                      <a:r>
+                        <a:rPr lang="fr-FR" sz="1200" dirty="0" err="1"/>
+                        <a:t>identity</a:t>
+                      </a:r>
+                      <a:r>
+                        <a:rPr lang="fr-FR" sz="1200" dirty="0"/>
+                        <a:t>)</a:t>
+                      </a:r>
                       <a:endParaRPr lang="fr-FR" sz="1200" b="1" dirty="0"/>
                     </a:p>
-                    <a:p>
-                      <a:r>
-                        <a:rPr lang="fr-FR" sz="1200" b="1" dirty="0"/>
+                  </a:txBody>
+                  <a:tcPr/>
+                </a:tc>
+                <a:tc>
+                  <a:txBody>
+                    <a:bodyPr/>
+                    <a:lstStyle/>
+                    <a:p>
+                      <a:r>
+                        <a:rPr lang="fr-FR" sz="1200" dirty="0" err="1"/>
+                        <a:t>Civilite</a:t>
+                      </a:r>
+                      <a:endParaRPr lang="fr-FR" sz="1200" dirty="0"/>
+                    </a:p>
+                    <a:p>
+                      <a:r>
+                        <a:rPr lang="fr-FR" sz="1200" dirty="0"/>
+                        <a:t>(nvarchar8)</a:t>
+                      </a:r>
+                      <a:endParaRPr lang="fr-FR" sz="1200" b="1" dirty="0"/>
+                    </a:p>
+                  </a:txBody>
+                  <a:tcPr/>
+                </a:tc>
+                <a:tc>
+                  <a:txBody>
+                    <a:bodyPr/>
+                    <a:lstStyle/>
+                    <a:p>
+                      <a:r>
+                        <a:rPr lang="fr-FR" sz="1200" dirty="0"/>
+                        <a:t>Nom</a:t>
+                      </a:r>
+                    </a:p>
+                    <a:p>
+                      <a:r>
+                        <a:rPr lang="fr-FR" sz="1200" dirty="0"/>
+                        <a:t>(nvarchar32)</a:t>
+                      </a:r>
+                      <a:endParaRPr lang="fr-FR" sz="1200" b="1" dirty="0"/>
+                    </a:p>
+                  </a:txBody>
+                  <a:tcPr/>
+                </a:tc>
+                <a:tc>
+                  <a:txBody>
+                    <a:bodyPr/>
+                    <a:lstStyle/>
+                    <a:p>
+                      <a:r>
+                        <a:rPr lang="fr-FR" sz="1200" dirty="0" err="1"/>
+                        <a:t>Prenom</a:t>
+                      </a:r>
+                      <a:endParaRPr lang="fr-FR" sz="1200" dirty="0"/>
+                    </a:p>
+                    <a:p>
+                      <a:r>
+                        <a:rPr lang="fr-FR" sz="1200" dirty="0"/>
+                        <a:t>(nvarchar32)</a:t>
+                      </a:r>
+                      <a:endParaRPr lang="fr-FR" sz="1200" b="1" dirty="0"/>
+                    </a:p>
+                  </a:txBody>
+                  <a:tcPr/>
+                </a:tc>
+                <a:tc>
+                  <a:txBody>
+                    <a:bodyPr/>
+                    <a:lstStyle/>
+                    <a:p>
+                      <a:r>
+                        <a:rPr lang="fr-FR" sz="1200" dirty="0"/>
+                        <a:t>Adresse</a:t>
+                      </a:r>
+                    </a:p>
+                    <a:p>
+                      <a:r>
+                        <a:rPr lang="fr-FR" sz="1200" dirty="0"/>
+                        <a:t>(nvarchar64)</a:t>
+                      </a:r>
+                      <a:endParaRPr lang="fr-FR" sz="1200" b="1" dirty="0"/>
+                    </a:p>
+                  </a:txBody>
+                  <a:tcPr/>
+                </a:tc>
+                <a:tc>
+                  <a:txBody>
+                    <a:bodyPr/>
+                    <a:lstStyle/>
+                    <a:p>
+                      <a:r>
+                        <a:rPr lang="fr-FR" sz="1200" dirty="0" err="1"/>
+                        <a:t>Telephone</a:t>
+                      </a:r>
+                      <a:endParaRPr lang="fr-FR" sz="1200" dirty="0"/>
+                    </a:p>
+                    <a:p>
+                      <a:r>
+                        <a:rPr lang="fr-FR" sz="1200" dirty="0"/>
+                        <a:t>(nvarchar16)</a:t>
+                      </a:r>
+                      <a:endParaRPr lang="fr-FR" sz="1200" b="1" dirty="0"/>
+                    </a:p>
+                  </a:txBody>
+                  <a:tcPr/>
+                </a:tc>
+                <a:tc>
+                  <a:txBody>
+                    <a:bodyPr/>
+                    <a:lstStyle/>
+                    <a:p>
+                      <a:r>
+                        <a:rPr lang="fr-FR" sz="1200" dirty="0" err="1"/>
+                        <a:t>DateNaissance</a:t>
+                      </a:r>
+                      <a:endParaRPr lang="fr-FR" sz="1200" dirty="0"/>
+                    </a:p>
+                    <a:p>
+                      <a:r>
+                        <a:rPr lang="fr-FR" sz="1200" dirty="0"/>
+                        <a:t>(date)</a:t>
+                      </a:r>
+                      <a:endParaRPr lang="fr-FR" sz="1200" b="1" dirty="0"/>
+                    </a:p>
+                  </a:txBody>
+                  <a:tcPr/>
+                </a:tc>
+                <a:tc>
+                  <a:txBody>
+                    <a:bodyPr/>
+                    <a:lstStyle/>
+                    <a:p>
+                      <a:r>
+                        <a:rPr lang="fr-FR" sz="1200" dirty="0"/>
+                        <a:t>/ Age</a:t>
+                      </a:r>
+                    </a:p>
+                    <a:p>
+                      <a:r>
+                        <a:rPr lang="fr-FR" sz="1200" dirty="0"/>
                         <a:t>(</a:t>
                       </a:r>
                       <a:r>
-                        <a:rPr lang="fr-FR" sz="1200" b="1" dirty="0" err="1"/>
-                        <a:t>identity</a:t>
-                      </a:r>
-                      <a:r>
-                        <a:rPr lang="fr-FR" sz="1200" b="1" dirty="0"/>
+                        <a:rPr lang="fr-FR" sz="1200" dirty="0" err="1"/>
+                        <a:t>int</a:t>
+                      </a:r>
+                      <a:r>
+                        <a:rPr lang="fr-FR" sz="1200" dirty="0"/>
                         <a:t>)</a:t>
                       </a:r>
-                    </a:p>
-                  </a:txBody>
-                  <a:tcPr/>
-                </a:tc>
-                <a:tc>
-                  <a:txBody>
-                    <a:bodyPr/>
-                    <a:lstStyle/>
-                    <a:p>
-                      <a:r>
-                        <a:rPr lang="fr-FR" sz="1200" b="1" dirty="0" err="1"/>
-                        <a:t>Civilite</a:t>
-                      </a:r>
                       <a:endParaRPr lang="fr-FR" sz="1200" b="1" dirty="0"/>
                     </a:p>
-                    <a:p>
-                      <a:r>
-                        <a:rPr lang="fr-FR" sz="1200" b="1" dirty="0"/>
-                        <a:t>(nvarchar8)</a:t>
-                      </a:r>
-                    </a:p>
-                  </a:txBody>
-                  <a:tcPr/>
-                </a:tc>
-                <a:tc>
-                  <a:txBody>
-                    <a:bodyPr/>
-                    <a:lstStyle/>
-                    <a:p>
-                      <a:r>
-                        <a:rPr lang="fr-FR" sz="1200" b="1" dirty="0"/>
-                        <a:t>Nom</a:t>
-                      </a:r>
-                    </a:p>
-                    <a:p>
-                      <a:r>
-                        <a:rPr lang="fr-FR" sz="1200" b="1" dirty="0"/>
-                        <a:t>(nvarchar32)</a:t>
-                      </a:r>
-                    </a:p>
-                  </a:txBody>
-                  <a:tcPr/>
-                </a:tc>
-                <a:tc>
-                  <a:txBody>
-                    <a:bodyPr/>
-                    <a:lstStyle/>
-                    <a:p>
-                      <a:r>
-                        <a:rPr lang="fr-FR" sz="1200" b="1" dirty="0" err="1"/>
-                        <a:t>Prenom</a:t>
+                  </a:txBody>
+                  <a:tcPr/>
+                </a:tc>
+                <a:tc>
+                  <a:txBody>
+                    <a:bodyPr/>
+                    <a:lstStyle/>
+                    <a:p>
+                      <a:r>
+                        <a:rPr lang="fr-FR" sz="1200" dirty="0"/>
+                        <a:t>Client</a:t>
+                      </a:r>
+                    </a:p>
+                    <a:p>
+                      <a:r>
+                        <a:rPr lang="fr-FR" sz="1200" dirty="0"/>
+                        <a:t>(bit)</a:t>
                       </a:r>
                       <a:endParaRPr lang="fr-FR" sz="1200" b="1" dirty="0"/>
                     </a:p>
-                    <a:p>
-                      <a:r>
-                        <a:rPr lang="fr-FR" sz="1200" b="1" dirty="0"/>
-                        <a:t>(nvarcher32)</a:t>
-                      </a:r>
-                    </a:p>
-                  </a:txBody>
-                  <a:tcPr/>
-                </a:tc>
-                <a:tc>
-                  <a:txBody>
-                    <a:bodyPr/>
-                    <a:lstStyle/>
-                    <a:p>
-                      <a:r>
-                        <a:rPr lang="fr-FR" sz="1200" b="1" dirty="0"/>
-                        <a:t>Adresse</a:t>
-                      </a:r>
-                    </a:p>
-                    <a:p>
-                      <a:r>
-                        <a:rPr lang="fr-FR" sz="1200" b="1" dirty="0"/>
+                  </a:txBody>
+                  <a:tcPr/>
+                </a:tc>
+                <a:tc>
+                  <a:txBody>
+                    <a:bodyPr/>
+                    <a:lstStyle/>
+                    <a:p>
+                      <a:r>
+                        <a:rPr lang="fr-FR" sz="1200" dirty="0"/>
+                        <a:t>Email</a:t>
+                      </a:r>
+                    </a:p>
+                    <a:p>
+                      <a:r>
+                        <a:rPr lang="fr-FR" sz="1200" dirty="0"/>
                         <a:t>(nvarchar64)</a:t>
                       </a:r>
-                    </a:p>
-                  </a:txBody>
-                  <a:tcPr/>
-                </a:tc>
-                <a:tc>
-                  <a:txBody>
-                    <a:bodyPr/>
-                    <a:lstStyle/>
-                    <a:p>
-                      <a:r>
-                        <a:rPr lang="fr-FR" sz="1200" b="1" dirty="0" err="1"/>
-                        <a:t>Telephone</a:t>
-                      </a:r>
                       <a:endParaRPr lang="fr-FR" sz="1200" b="1" dirty="0"/>
-                    </a:p>
-                    <a:p>
-                      <a:r>
-                        <a:rPr lang="fr-FR" sz="1200" b="1" dirty="0"/>
-                        <a:t>(nvarchar16)</a:t>
-                      </a:r>
-                    </a:p>
-                  </a:txBody>
-                  <a:tcPr/>
-                </a:tc>
-                <a:tc>
-                  <a:txBody>
-                    <a:bodyPr/>
-                    <a:lstStyle/>
-                    <a:p>
-                      <a:r>
-                        <a:rPr lang="fr-FR" sz="1200" b="1" dirty="0" err="1"/>
-                        <a:t>DateNaissance</a:t>
-                      </a:r>
-                      <a:endParaRPr lang="fr-FR" sz="1200" b="1" dirty="0"/>
-                    </a:p>
-                    <a:p>
-                      <a:r>
-                        <a:rPr lang="fr-FR" sz="1200" b="1" dirty="0"/>
-                        <a:t>(date)</a:t>
-                      </a:r>
-                    </a:p>
-                  </a:txBody>
-                  <a:tcPr/>
-                </a:tc>
-                <a:tc>
-                  <a:txBody>
-                    <a:bodyPr/>
-                    <a:lstStyle/>
-                    <a:p>
-                      <a:r>
-                        <a:rPr lang="fr-FR" sz="1200" b="1" dirty="0"/>
-                        <a:t>/ Age</a:t>
-                      </a:r>
-                    </a:p>
-                    <a:p>
-                      <a:r>
-                        <a:rPr lang="fr-FR" sz="1200" b="1" dirty="0"/>
-                        <a:t>(</a:t>
-                      </a:r>
-                      <a:r>
-                        <a:rPr lang="fr-FR" sz="1200" b="1" dirty="0" err="1"/>
-                        <a:t>int</a:t>
-                      </a:r>
-                      <a:r>
-                        <a:rPr lang="fr-FR" sz="1200" b="1" dirty="0"/>
-                        <a:t>)</a:t>
-                      </a:r>
-                    </a:p>
-                  </a:txBody>
-                  <a:tcPr/>
-                </a:tc>
-                <a:tc>
-                  <a:txBody>
-                    <a:bodyPr/>
-                    <a:lstStyle/>
-                    <a:p>
-                      <a:r>
-                        <a:rPr lang="fr-FR" sz="1200" b="1" dirty="0"/>
-                        <a:t>Client</a:t>
-                      </a:r>
-                    </a:p>
-                    <a:p>
-                      <a:r>
-                        <a:rPr lang="fr-FR" sz="1200" b="1" dirty="0"/>
-                        <a:t>(bit)</a:t>
-                      </a:r>
-                    </a:p>
-                  </a:txBody>
-                  <a:tcPr/>
-                </a:tc>
-                <a:tc>
-                  <a:txBody>
-                    <a:bodyPr/>
-                    <a:lstStyle/>
-                    <a:p>
-                      <a:r>
-                        <a:rPr lang="fr-FR" sz="1200" b="1" dirty="0"/>
-                        <a:t>Email</a:t>
-                      </a:r>
-                    </a:p>
-                    <a:p>
-                      <a:r>
-                        <a:rPr lang="fr-FR" sz="1200" b="1" dirty="0"/>
-                        <a:t>(nvarchar64)</a:t>
-                      </a:r>
                     </a:p>
                   </a:txBody>
                   <a:tcPr/>
@@ -8053,6 +8140,40 @@
                     <a:bodyPr/>
                     <a:lstStyle/>
                     <a:p>
+                      <a:pPr marL="0" marR="0" lvl="0" indent="0" algn="ctr" defTabSz="1280160" rtl="0" eaLnBrk="1" fontAlgn="auto" latinLnBrk="0" hangingPunct="1">
+                        <a:lnSpc>
+                          <a:spcPct val="100000"/>
+                        </a:lnSpc>
+                        <a:spcBef>
+                          <a:spcPts val="0"/>
+                        </a:spcBef>
+                        <a:spcAft>
+                          <a:spcPts val="0"/>
+                        </a:spcAft>
+                        <a:buClrTx/>
+                        <a:buSzTx/>
+                        <a:buFontTx/>
+                        <a:buNone/>
+                        <a:tabLst/>
+                        <a:defRPr/>
+                      </a:pPr>
+                      <a:r>
+                        <a:rPr lang="fr-FR" sz="1400" b="1" dirty="0">
+                          <a:solidFill>
+                            <a:srgbClr val="00B050"/>
+                          </a:solidFill>
+                        </a:rPr>
+                        <a:t>PK</a:t>
+                      </a:r>
+                    </a:p>
+                  </a:txBody>
+                  <a:tcPr/>
+                </a:tc>
+                <a:tc>
+                  <a:txBody>
+                    <a:bodyPr/>
+                    <a:lstStyle/>
+                    <a:p>
                       <a:endParaRPr lang="fr-FR" sz="1200" dirty="0"/>
                     </a:p>
                   </a:txBody>
@@ -8113,17 +8234,15 @@
                     <a:bodyPr/>
                     <a:lstStyle/>
                     <a:p>
-                      <a:endParaRPr lang="fr-FR" sz="1200" dirty="0"/>
-                    </a:p>
-                  </a:txBody>
-                  <a:tcPr/>
-                </a:tc>
-                <a:tc>
-                  <a:txBody>
-                    <a:bodyPr/>
-                    <a:lstStyle/>
-                    <a:p>
-                      <a:endParaRPr lang="fr-FR" sz="1200" dirty="0"/>
+                      <a:pPr algn="ctr"/>
+                      <a:r>
+                        <a:rPr lang="fr-FR" sz="1300" b="1" dirty="0">
+                          <a:solidFill>
+                            <a:srgbClr val="7030A0"/>
+                          </a:solidFill>
+                        </a:rPr>
+                        <a:t>À Calculer</a:t>
+                      </a:r>
                     </a:p>
                   </a:txBody>
                   <a:tcPr/>
@@ -8173,14 +8292,14 @@
           <p:nvPr>
             <p:extLst>
               <p:ext uri="{D42A27DB-BD31-4B8C-83A1-F6EECF244321}">
-                <p14:modId xmlns:p14="http://schemas.microsoft.com/office/powerpoint/2010/main" val="1487741491"/>
+                <p14:modId xmlns:p14="http://schemas.microsoft.com/office/powerpoint/2010/main" val="1961934923"/>
               </p:ext>
             </p:extLst>
           </p:nvPr>
         </p:nvGraphicFramePr>
         <p:xfrm>
-          <a:off x="563823" y="2981971"/>
-          <a:ext cx="7974694" cy="1066800"/>
+          <a:off x="563823" y="2664471"/>
+          <a:ext cx="7974694" cy="1097280"/>
         </p:xfrm>
         <a:graphic>
           <a:graphicData uri="http://schemas.openxmlformats.org/drawingml/2006/table">
@@ -8248,7 +8367,7 @@
                       <a:pPr algn="ctr"/>
                       <a:r>
                         <a:rPr lang="fr-FR" sz="1600" dirty="0"/>
-                        <a:t>Voyage</a:t>
+                        <a:t>Voyages</a:t>
                       </a:r>
                     </a:p>
                   </a:txBody>
@@ -8340,7 +8459,7 @@
                       </a:r>
                       <a:r>
                         <a:rPr lang="fr-FR" sz="1200" b="1" dirty="0" err="1"/>
-                        <a:t>indentity</a:t>
+                        <a:t>identity</a:t>
                       </a:r>
                       <a:r>
                         <a:rPr lang="fr-FR" sz="1200" b="1" dirty="0"/>
@@ -8425,22 +8544,34 @@
                     <a:p>
                       <a:r>
                         <a:rPr lang="fr-FR" sz="1200" b="1" dirty="0" err="1"/>
-                        <a:t>tarifToutCompris</a:t>
+                        <a:t>tarifTTC</a:t>
                       </a:r>
                       <a:endParaRPr lang="fr-FR" sz="1200" b="1" dirty="0"/>
                     </a:p>
                     <a:p>
                       <a:r>
                         <a:rPr lang="fr-FR" sz="1200" b="1" dirty="0"/>
-                        <a:t>(</a:t>
-                      </a:r>
+                        <a:t>(money)</a:t>
+                      </a:r>
+                    </a:p>
+                  </a:txBody>
+                  <a:tcPr/>
+                </a:tc>
+                <a:tc>
+                  <a:txBody>
+                    <a:bodyPr/>
+                    <a:lstStyle/>
+                    <a:p>
                       <a:r>
                         <a:rPr lang="fr-FR" sz="1200" b="1" dirty="0" err="1"/>
-                        <a:t>currency</a:t>
-                      </a:r>
+                        <a:t>AgenceVoyage</a:t>
+                      </a:r>
+                      <a:endParaRPr lang="fr-FR" sz="1200" b="1" dirty="0"/>
+                    </a:p>
+                    <a:p>
                       <a:r>
                         <a:rPr lang="fr-FR" sz="1200" b="1" dirty="0"/>
-                        <a:t> ?)</a:t>
+                        <a:t>(nvarchar64)</a:t>
                       </a:r>
                     </a:p>
                   </a:txBody>
@@ -8491,26 +8622,6 @@
                   </a:txBody>
                   <a:tcPr/>
                 </a:tc>
-                <a:tc>
-                  <a:txBody>
-                    <a:bodyPr/>
-                    <a:lstStyle/>
-                    <a:p>
-                      <a:r>
-                        <a:rPr lang="fr-FR" sz="1200" b="1" dirty="0" err="1"/>
-                        <a:t>AgenceVoyage</a:t>
-                      </a:r>
-                      <a:endParaRPr lang="fr-FR" sz="1200" b="1" dirty="0"/>
-                    </a:p>
-                    <a:p>
-                      <a:r>
-                        <a:rPr lang="fr-FR" sz="1200" b="1" dirty="0"/>
-                        <a:t>(nvarchar64)</a:t>
-                      </a:r>
-                    </a:p>
-                  </a:txBody>
-                  <a:tcPr/>
-                </a:tc>
                 <a:extLst>
                   <a:ext uri="{0D108BD9-81ED-4DB2-BD59-A6C34878D82A}">
                     <a16:rowId xmlns:a16="http://schemas.microsoft.com/office/drawing/2014/main" val="10001"/>
@@ -8523,6 +8634,40 @@
                     <a:bodyPr/>
                     <a:lstStyle/>
                     <a:p>
+                      <a:pPr marL="0" marR="0" lvl="0" indent="0" algn="ctr" defTabSz="1280160" rtl="0" eaLnBrk="1" fontAlgn="auto" latinLnBrk="0" hangingPunct="1">
+                        <a:lnSpc>
+                          <a:spcPct val="100000"/>
+                        </a:lnSpc>
+                        <a:spcBef>
+                          <a:spcPts val="0"/>
+                        </a:spcBef>
+                        <a:spcAft>
+                          <a:spcPts val="0"/>
+                        </a:spcAft>
+                        <a:buClrTx/>
+                        <a:buSzTx/>
+                        <a:buFontTx/>
+                        <a:buNone/>
+                        <a:tabLst/>
+                        <a:defRPr/>
+                      </a:pPr>
+                      <a:r>
+                        <a:rPr lang="fr-FR" sz="1400" b="1" dirty="0">
+                          <a:solidFill>
+                            <a:srgbClr val="00B050"/>
+                          </a:solidFill>
+                        </a:rPr>
+                        <a:t>PK</a:t>
+                      </a:r>
+                    </a:p>
+                  </a:txBody>
+                  <a:tcPr/>
+                </a:tc>
+                <a:tc>
+                  <a:txBody>
+                    <a:bodyPr/>
+                    <a:lstStyle/>
+                    <a:p>
                       <a:endParaRPr lang="fr-FR" sz="1200" dirty="0"/>
                     </a:p>
                   </a:txBody>
@@ -8573,16 +8718,15 @@
                     <a:bodyPr/>
                     <a:lstStyle/>
                     <a:p>
-                      <a:endParaRPr lang="fr-FR" sz="1200" dirty="0"/>
-                    </a:p>
-                  </a:txBody>
-                  <a:tcPr/>
-                </a:tc>
-                <a:tc>
-                  <a:txBody>
-                    <a:bodyPr/>
-                    <a:lstStyle/>
-                    <a:p>
+                      <a:pPr algn="ctr"/>
+                      <a:r>
+                        <a:rPr lang="fr-FR" sz="1200" b="1" dirty="0">
+                          <a:solidFill>
+                            <a:srgbClr val="C00000"/>
+                          </a:solidFill>
+                        </a:rPr>
+                        <a:t>FK</a:t>
+                      </a:r>
                       <a:endParaRPr lang="fr-FR" sz="1200" dirty="0"/>
                     </a:p>
                   </a:txBody>
@@ -8613,20 +8757,20 @@
           <p:nvPr>
             <p:extLst>
               <p:ext uri="{D42A27DB-BD31-4B8C-83A1-F6EECF244321}">
-                <p14:modId xmlns:p14="http://schemas.microsoft.com/office/powerpoint/2010/main" val="3766301629"/>
+                <p14:modId xmlns:p14="http://schemas.microsoft.com/office/powerpoint/2010/main" val="2804569358"/>
               </p:ext>
             </p:extLst>
           </p:nvPr>
         </p:nvGraphicFramePr>
         <p:xfrm>
-          <a:off x="5126552" y="4546987"/>
-          <a:ext cx="6681120" cy="1066800"/>
+          <a:off x="5126552" y="4394587"/>
+          <a:ext cx="6681120" cy="1097280"/>
         </p:xfrm>
         <a:graphic>
           <a:graphicData uri="http://schemas.openxmlformats.org/drawingml/2006/table">
             <a:tbl>
               <a:tblPr firstRow="1" bandRow="1">
-                <a:tableStyleId>{5C22544A-7EE6-4342-B048-85BDC9FD1C3A}</a:tableStyleId>
+                <a:tableStyleId>{93296810-A885-4BE3-A3E7-6D5BEEA58F35}</a:tableStyleId>
               </a:tblPr>
               <a:tblGrid>
                 <a:gridCol w="1336224">
@@ -8674,7 +8818,7 @@
                       <a:pPr algn="ctr"/>
                       <a:r>
                         <a:rPr lang="fr-FR" sz="1600" dirty="0"/>
-                        <a:t>Destination</a:t>
+                        <a:t>Destinations</a:t>
                       </a:r>
                     </a:p>
                   </a:txBody>
@@ -8733,101 +8877,106 @@
                     <a:lstStyle/>
                     <a:p>
                       <a:r>
-                        <a:rPr lang="fr-FR" sz="1200" b="1" dirty="0" err="1"/>
+                        <a:rPr lang="fr-FR" sz="1200" dirty="0" err="1"/>
                         <a:t>ID_Destination</a:t>
                       </a:r>
+                      <a:endParaRPr lang="fr-FR" sz="1200" dirty="0"/>
+                    </a:p>
+                    <a:p>
+                      <a:r>
+                        <a:rPr lang="fr-FR" sz="1200" dirty="0"/>
+                        <a:t>(</a:t>
+                      </a:r>
+                      <a:r>
+                        <a:rPr lang="fr-FR" sz="1200" dirty="0" err="1"/>
+                        <a:t>identity</a:t>
+                      </a:r>
+                      <a:r>
+                        <a:rPr lang="fr-FR" sz="1200" dirty="0"/>
+                        <a:t>)</a:t>
+                      </a:r>
                       <a:endParaRPr lang="fr-FR" sz="1200" b="1" dirty="0"/>
                     </a:p>
-                    <a:p>
-                      <a:r>
-                        <a:rPr lang="fr-FR" sz="1200" b="1" dirty="0"/>
-                        <a:t>(</a:t>
-                      </a:r>
-                      <a:r>
-                        <a:rPr lang="fr-FR" sz="1200" b="1" dirty="0" err="1"/>
-                        <a:t>identity</a:t>
-                      </a:r>
-                      <a:r>
-                        <a:rPr lang="fr-FR" sz="1200" b="1" dirty="0"/>
-                        <a:t>)</a:t>
-                      </a:r>
-                    </a:p>
-                  </a:txBody>
-                  <a:tcPr/>
-                </a:tc>
-                <a:tc>
-                  <a:txBody>
-                    <a:bodyPr/>
-                    <a:lstStyle/>
-                    <a:p>
-                      <a:r>
-                        <a:rPr lang="fr-FR" sz="1200" b="1" dirty="0"/>
+                  </a:txBody>
+                  <a:tcPr/>
+                </a:tc>
+                <a:tc>
+                  <a:txBody>
+                    <a:bodyPr/>
+                    <a:lstStyle/>
+                    <a:p>
+                      <a:r>
+                        <a:rPr lang="fr-FR" sz="1200" dirty="0"/>
                         <a:t>Continent</a:t>
                       </a:r>
                     </a:p>
                     <a:p>
                       <a:r>
-                        <a:rPr lang="fr-FR" sz="1200" b="1" dirty="0"/>
+                        <a:rPr lang="fr-FR" sz="1200" dirty="0"/>
                         <a:t>(nvarchar16)</a:t>
                       </a:r>
-                    </a:p>
-                  </a:txBody>
-                  <a:tcPr/>
-                </a:tc>
-                <a:tc>
-                  <a:txBody>
-                    <a:bodyPr/>
-                    <a:lstStyle/>
-                    <a:p>
-                      <a:r>
-                        <a:rPr lang="fr-FR" sz="1200" b="1" dirty="0"/>
+                      <a:endParaRPr lang="fr-FR" sz="1200" b="1" dirty="0"/>
+                    </a:p>
+                  </a:txBody>
+                  <a:tcPr/>
+                </a:tc>
+                <a:tc>
+                  <a:txBody>
+                    <a:bodyPr/>
+                    <a:lstStyle/>
+                    <a:p>
+                      <a:r>
+                        <a:rPr lang="fr-FR" sz="1200" dirty="0"/>
                         <a:t>Pays</a:t>
                       </a:r>
                     </a:p>
                     <a:p>
                       <a:r>
-                        <a:rPr lang="fr-FR" sz="1200" b="1" dirty="0"/>
+                        <a:rPr lang="fr-FR" sz="1200" dirty="0"/>
                         <a:t>(nvarchar32)</a:t>
                       </a:r>
-                    </a:p>
-                  </a:txBody>
-                  <a:tcPr/>
-                </a:tc>
-                <a:tc>
-                  <a:txBody>
-                    <a:bodyPr/>
-                    <a:lstStyle/>
-                    <a:p>
-                      <a:r>
-                        <a:rPr lang="fr-FR" sz="1200" b="1" dirty="0" err="1"/>
+                      <a:endParaRPr lang="fr-FR" sz="1200" b="1" dirty="0"/>
+                    </a:p>
+                  </a:txBody>
+                  <a:tcPr/>
+                </a:tc>
+                <a:tc>
+                  <a:txBody>
+                    <a:bodyPr/>
+                    <a:lstStyle/>
+                    <a:p>
+                      <a:r>
+                        <a:rPr lang="fr-FR" sz="1200" dirty="0" err="1"/>
                         <a:t>Region</a:t>
                       </a:r>
+                      <a:endParaRPr lang="fr-FR" sz="1200" dirty="0"/>
+                    </a:p>
+                    <a:p>
+                      <a:r>
+                        <a:rPr lang="fr-FR" sz="1200" dirty="0"/>
+                        <a:t>(nvarchar32)</a:t>
+                      </a:r>
                       <a:endParaRPr lang="fr-FR" sz="1200" b="1" dirty="0"/>
                     </a:p>
-                    <a:p>
-                      <a:r>
-                        <a:rPr lang="fr-FR" sz="1200" b="1" dirty="0"/>
-                        <a:t>(nvarchar32)</a:t>
-                      </a:r>
-                    </a:p>
-                  </a:txBody>
-                  <a:tcPr/>
-                </a:tc>
-                <a:tc>
-                  <a:txBody>
-                    <a:bodyPr/>
-                    <a:lstStyle/>
-                    <a:p>
-                      <a:r>
-                        <a:rPr lang="fr-FR" sz="1200" b="1" dirty="0"/>
+                  </a:txBody>
+                  <a:tcPr/>
+                </a:tc>
+                <a:tc>
+                  <a:txBody>
+                    <a:bodyPr/>
+                    <a:lstStyle/>
+                    <a:p>
+                      <a:r>
+                        <a:rPr lang="fr-FR" sz="1200" dirty="0"/>
                         <a:t>Description</a:t>
                       </a:r>
                     </a:p>
                     <a:p>
                       <a:r>
-                        <a:rPr lang="fr-FR" sz="1200" b="1" dirty="0"/>
+                        <a:rPr lang="fr-FR" sz="1200" dirty="0"/>
                         <a:t>(nvarchar512)</a:t>
                       </a:r>
+                      <a:endParaRPr lang="fr-FR" sz="1200" b="1" dirty="0"/>
                     </a:p>
                   </a:txBody>
                   <a:tcPr/>
@@ -8844,7 +8993,31 @@
                     <a:bodyPr/>
                     <a:lstStyle/>
                     <a:p>
-                      <a:endParaRPr lang="fr-FR" sz="1200" dirty="0"/>
+                      <a:pPr marL="0" marR="0" lvl="0" indent="0" algn="ctr" defTabSz="1280160" rtl="0" eaLnBrk="1" fontAlgn="auto" latinLnBrk="0" hangingPunct="1">
+                        <a:lnSpc>
+                          <a:spcPct val="100000"/>
+                        </a:lnSpc>
+                        <a:spcBef>
+                          <a:spcPts val="0"/>
+                        </a:spcBef>
+                        <a:spcAft>
+                          <a:spcPts val="0"/>
+                        </a:spcAft>
+                        <a:buClrTx/>
+                        <a:buSzTx/>
+                        <a:buFontTx/>
+                        <a:buNone/>
+                        <a:tabLst/>
+                        <a:defRPr/>
+                      </a:pPr>
+                      <a:r>
+                        <a:rPr lang="fr-FR" sz="1400" b="1" dirty="0">
+                          <a:solidFill>
+                            <a:srgbClr val="00B050"/>
+                          </a:solidFill>
+                        </a:rPr>
+                        <a:t>PK</a:t>
+                      </a:r>
                     </a:p>
                   </a:txBody>
                   <a:tcPr/>
@@ -8914,20 +9087,20 @@
           <p:nvPr>
             <p:extLst>
               <p:ext uri="{D42A27DB-BD31-4B8C-83A1-F6EECF244321}">
-                <p14:modId xmlns:p14="http://schemas.microsoft.com/office/powerpoint/2010/main" val="3576345248"/>
+                <p14:modId xmlns:p14="http://schemas.microsoft.com/office/powerpoint/2010/main" val="890886052"/>
               </p:ext>
             </p:extLst>
           </p:nvPr>
         </p:nvGraphicFramePr>
         <p:xfrm>
-          <a:off x="563823" y="4546987"/>
-          <a:ext cx="3600404" cy="1066800"/>
+          <a:off x="563823" y="4394587"/>
+          <a:ext cx="3600404" cy="1097280"/>
         </p:xfrm>
         <a:graphic>
           <a:graphicData uri="http://schemas.openxmlformats.org/drawingml/2006/table">
             <a:tbl>
               <a:tblPr firstRow="1" bandRow="1">
-                <a:tableStyleId>{5C22544A-7EE6-4342-B048-85BDC9FD1C3A}</a:tableStyleId>
+                <a:tableStyleId>{21E4AEA4-8DFA-4A89-87EB-49C32662AFE0}</a:tableStyleId>
               </a:tblPr>
               <a:tblGrid>
                 <a:gridCol w="1477274">
@@ -8954,11 +9127,15 @@
                       <a:pPr algn="ctr"/>
                       <a:r>
                         <a:rPr lang="fr-FR" sz="1600" dirty="0"/>
-                        <a:t>Participe</a:t>
-                      </a:r>
-                    </a:p>
-                  </a:txBody>
-                  <a:tcPr/>
+                        <a:t>Participer</a:t>
+                      </a:r>
+                    </a:p>
+                  </a:txBody>
+                  <a:tcPr>
+                    <a:solidFill>
+                      <a:srgbClr val="FF0000"/>
+                    </a:solidFill>
+                  </a:tcPr>
                 </a:tc>
                 <a:tc hMerge="1">
                   <a:txBody>
@@ -8983,52 +9160,54 @@
                     <a:lstStyle/>
                     <a:p>
                       <a:r>
-                        <a:rPr lang="fr-FR" sz="1200" b="1" dirty="0" err="1"/>
+                        <a:rPr lang="fr-FR" sz="1200" dirty="0" err="1"/>
                         <a:t>ID_Participant</a:t>
                       </a:r>
+                      <a:endParaRPr lang="fr-FR" sz="1200" dirty="0"/>
+                    </a:p>
+                    <a:p>
+                      <a:r>
+                        <a:rPr lang="fr-FR" sz="1200" dirty="0"/>
+                        <a:t>(</a:t>
+                      </a:r>
+                      <a:r>
+                        <a:rPr lang="fr-FR" sz="1200" dirty="0" err="1"/>
+                        <a:t>int</a:t>
+                      </a:r>
+                      <a:r>
+                        <a:rPr lang="fr-FR" sz="1200" dirty="0"/>
+                        <a:t>)</a:t>
+                      </a:r>
                       <a:endParaRPr lang="fr-FR" sz="1200" b="1" dirty="0"/>
                     </a:p>
-                    <a:p>
-                      <a:r>
-                        <a:rPr lang="fr-FR" sz="1200" b="1" dirty="0"/>
+                  </a:txBody>
+                  <a:tcPr/>
+                </a:tc>
+                <a:tc>
+                  <a:txBody>
+                    <a:bodyPr/>
+                    <a:lstStyle/>
+                    <a:p>
+                      <a:r>
+                        <a:rPr lang="fr-FR" sz="1200" dirty="0" err="1"/>
+                        <a:t>ID_Dossier</a:t>
+                      </a:r>
+                      <a:endParaRPr lang="fr-FR" sz="1200" dirty="0"/>
+                    </a:p>
+                    <a:p>
+                      <a:r>
+                        <a:rPr lang="fr-FR" sz="1200" dirty="0"/>
                         <a:t>(</a:t>
                       </a:r>
                       <a:r>
-                        <a:rPr lang="fr-FR" sz="1200" b="1" dirty="0" err="1"/>
+                        <a:rPr lang="fr-FR" sz="1200" dirty="0" err="1"/>
                         <a:t>int</a:t>
                       </a:r>
                       <a:r>
-                        <a:rPr lang="fr-FR" sz="1200" b="1" dirty="0"/>
+                        <a:rPr lang="fr-FR" sz="1200" dirty="0"/>
                         <a:t>)</a:t>
                       </a:r>
-                    </a:p>
-                  </a:txBody>
-                  <a:tcPr/>
-                </a:tc>
-                <a:tc>
-                  <a:txBody>
-                    <a:bodyPr/>
-                    <a:lstStyle/>
-                    <a:p>
-                      <a:r>
-                        <a:rPr lang="fr-FR" sz="1200" b="1" dirty="0" err="1"/>
-                        <a:t>ID_DossierReservation</a:t>
-                      </a:r>
                       <a:endParaRPr lang="fr-FR" sz="1200" b="1" dirty="0"/>
-                    </a:p>
-                    <a:p>
-                      <a:r>
-                        <a:rPr lang="fr-FR" sz="1200" b="1" dirty="0"/>
-                        <a:t>(</a:t>
-                      </a:r>
-                      <a:r>
-                        <a:rPr lang="fr-FR" sz="1200" b="1" dirty="0" err="1"/>
-                        <a:t>int</a:t>
-                      </a:r>
-                      <a:r>
-                        <a:rPr lang="fr-FR" sz="1200" b="1" dirty="0"/>
-                        <a:t>)</a:t>
-                      </a:r>
                     </a:p>
                   </a:txBody>
                   <a:tcPr/>
@@ -9045,17 +9224,34 @@
                     <a:bodyPr/>
                     <a:lstStyle/>
                     <a:p>
-                      <a:endParaRPr lang="fr-FR" sz="1200" dirty="0"/>
-                    </a:p>
-                  </a:txBody>
-                  <a:tcPr/>
-                </a:tc>
-                <a:tc>
-                  <a:txBody>
-                    <a:bodyPr/>
-                    <a:lstStyle/>
-                    <a:p>
-                      <a:endParaRPr lang="fr-FR" sz="1200" dirty="0"/>
+                      <a:pPr algn="ctr"/>
+                      <a:r>
+                        <a:rPr lang="fr-FR" sz="1400" b="1" dirty="0">
+                          <a:solidFill>
+                            <a:srgbClr val="C00000"/>
+                          </a:solidFill>
+                        </a:rPr>
+                        <a:t>FK</a:t>
+                      </a:r>
+                    </a:p>
+                  </a:txBody>
+                  <a:tcPr/>
+                </a:tc>
+                <a:tc>
+                  <a:txBody>
+                    <a:bodyPr/>
+                    <a:lstStyle/>
+                    <a:p>
+                      <a:pPr algn="ctr"/>
+                      <a:r>
+                        <a:rPr lang="fr-FR" sz="1400" b="1" dirty="0">
+                          <a:solidFill>
+                            <a:srgbClr val="C00000"/>
+                          </a:solidFill>
+                        </a:rPr>
+                        <a:t>FK</a:t>
+                      </a:r>
+                      <a:endParaRPr lang="fr-FR" sz="1400" dirty="0"/>
                     </a:p>
                   </a:txBody>
                   <a:tcPr/>
@@ -9085,20 +9281,20 @@
           <p:nvPr>
             <p:extLst>
               <p:ext uri="{D42A27DB-BD31-4B8C-83A1-F6EECF244321}">
-                <p14:modId xmlns:p14="http://schemas.microsoft.com/office/powerpoint/2010/main" val="3587916705"/>
+                <p14:modId xmlns:p14="http://schemas.microsoft.com/office/powerpoint/2010/main" val="1422997277"/>
               </p:ext>
             </p:extLst>
           </p:nvPr>
         </p:nvGraphicFramePr>
         <p:xfrm>
           <a:off x="5289963" y="890564"/>
-          <a:ext cx="3600404" cy="1066800"/>
+          <a:ext cx="3600404" cy="1097280"/>
         </p:xfrm>
         <a:graphic>
           <a:graphicData uri="http://schemas.openxmlformats.org/drawingml/2006/table">
             <a:tbl>
               <a:tblPr firstRow="1" bandRow="1">
-                <a:tableStyleId>{5C22544A-7EE6-4342-B048-85BDC9FD1C3A}</a:tableStyleId>
+                <a:tableStyleId>{93296810-A885-4BE3-A3E7-6D5BEEA58F35}</a:tableStyleId>
               </a:tblPr>
               <a:tblGrid>
                 <a:gridCol w="1242563">
@@ -9125,7 +9321,7 @@
                       <a:pPr algn="ctr"/>
                       <a:r>
                         <a:rPr lang="fr-FR" sz="1600" dirty="0"/>
-                        <a:t>Assurance</a:t>
+                        <a:t>Assurances</a:t>
                       </a:r>
                     </a:p>
                   </a:txBody>
@@ -9154,43 +9350,46 @@
                     <a:lstStyle/>
                     <a:p>
                       <a:r>
-                        <a:rPr lang="fr-FR" sz="1200" b="1" dirty="0" err="1"/>
+                        <a:rPr lang="fr-FR" sz="1200" dirty="0" err="1"/>
                         <a:t>ID_Assurance</a:t>
                       </a:r>
+                      <a:endParaRPr lang="fr-FR" sz="1200" dirty="0"/>
+                    </a:p>
+                    <a:p>
+                      <a:r>
+                        <a:rPr lang="fr-FR" sz="1200" dirty="0"/>
+                        <a:t>(</a:t>
+                      </a:r>
+                      <a:r>
+                        <a:rPr lang="fr-FR" sz="1200" dirty="0" err="1"/>
+                        <a:t>identity</a:t>
+                      </a:r>
+                      <a:r>
+                        <a:rPr lang="fr-FR" sz="1200" dirty="0"/>
+                        <a:t>)</a:t>
+                      </a:r>
                       <a:endParaRPr lang="fr-FR" sz="1200" b="1" dirty="0"/>
                     </a:p>
-                    <a:p>
-                      <a:r>
-                        <a:rPr lang="fr-FR" sz="1200" b="1" dirty="0"/>
-                        <a:t>(</a:t>
-                      </a:r>
-                      <a:r>
-                        <a:rPr lang="fr-FR" sz="1200" b="1" dirty="0" err="1"/>
-                        <a:t>identity</a:t>
-                      </a:r>
-                      <a:r>
-                        <a:rPr lang="fr-FR" sz="1200" b="1" dirty="0"/>
-                        <a:t>)</a:t>
-                      </a:r>
-                    </a:p>
-                  </a:txBody>
-                  <a:tcPr/>
-                </a:tc>
-                <a:tc>
-                  <a:txBody>
-                    <a:bodyPr/>
-                    <a:lstStyle/>
-                    <a:p>
-                      <a:r>
-                        <a:rPr lang="fr-FR" sz="1200" b="1" dirty="0"/>
-                        <a:t>Type</a:t>
-                      </a:r>
-                    </a:p>
-                    <a:p>
-                      <a:r>
-                        <a:rPr lang="fr-FR" sz="1200" b="1" dirty="0"/>
+                  </a:txBody>
+                  <a:tcPr/>
+                </a:tc>
+                <a:tc>
+                  <a:txBody>
+                    <a:bodyPr/>
+                    <a:lstStyle/>
+                    <a:p>
+                      <a:r>
+                        <a:rPr lang="fr-FR" sz="1200" dirty="0" err="1"/>
+                        <a:t>Type_Assurance</a:t>
+                      </a:r>
+                      <a:endParaRPr lang="fr-FR" sz="1200" dirty="0"/>
+                    </a:p>
+                    <a:p>
+                      <a:r>
+                        <a:rPr lang="fr-FR" sz="1200" dirty="0"/>
                         <a:t>(nvarchar64)</a:t>
                       </a:r>
+                      <a:endParaRPr lang="fr-FR" sz="1200" b="1" dirty="0"/>
                     </a:p>
                   </a:txBody>
                   <a:tcPr/>
@@ -9207,7 +9406,15 @@
                     <a:bodyPr/>
                     <a:lstStyle/>
                     <a:p>
-                      <a:endParaRPr lang="fr-FR" sz="1200" dirty="0"/>
+                      <a:pPr algn="ctr"/>
+                      <a:r>
+                        <a:rPr lang="fr-FR" sz="1400" b="1" dirty="0">
+                          <a:solidFill>
+                            <a:srgbClr val="00B050"/>
+                          </a:solidFill>
+                        </a:rPr>
+                        <a:t>PK</a:t>
+                      </a:r>
                     </a:p>
                   </a:txBody>
                   <a:tcPr/>
@@ -9247,20 +9454,20 @@
           <p:nvPr>
             <p:extLst>
               <p:ext uri="{D42A27DB-BD31-4B8C-83A1-F6EECF244321}">
-                <p14:modId xmlns:p14="http://schemas.microsoft.com/office/powerpoint/2010/main" val="1752981244"/>
+                <p14:modId xmlns:p14="http://schemas.microsoft.com/office/powerpoint/2010/main" val="3307188718"/>
               </p:ext>
             </p:extLst>
           </p:nvPr>
         </p:nvGraphicFramePr>
         <p:xfrm>
-          <a:off x="8935518" y="2981971"/>
-          <a:ext cx="2872154" cy="1066800"/>
+          <a:off x="9176818" y="2664471"/>
+          <a:ext cx="2872154" cy="1097280"/>
         </p:xfrm>
         <a:graphic>
           <a:graphicData uri="http://schemas.openxmlformats.org/drawingml/2006/table">
             <a:tbl>
               <a:tblPr firstRow="1" bandRow="1">
-                <a:tableStyleId>{5C22544A-7EE6-4342-B048-85BDC9FD1C3A}</a:tableStyleId>
+                <a:tableStyleId>{21E4AEA4-8DFA-4A89-87EB-49C32662AFE0}</a:tableStyleId>
               </a:tblPr>
               <a:tblGrid>
                 <a:gridCol w="1125022">
@@ -9290,7 +9497,11 @@
                       </a:r>
                     </a:p>
                   </a:txBody>
-                  <a:tcPr/>
+                  <a:tcPr>
+                    <a:solidFill>
+                      <a:srgbClr val="FF0000"/>
+                    </a:solidFill>
+                  </a:tcPr>
                 </a:tc>
                 <a:tc hMerge="1">
                   <a:txBody>
@@ -9332,10 +9543,10 @@
                         <a:defRPr/>
                       </a:pPr>
                       <a:r>
-                        <a:rPr lang="fr-FR" sz="1200" b="1" dirty="0" err="1"/>
+                        <a:rPr lang="fr-FR" sz="1200" dirty="0" err="1"/>
                         <a:t>ID_Assurance</a:t>
                       </a:r>
-                      <a:endParaRPr lang="fr-FR" sz="1200" b="1" dirty="0"/>
+                      <a:endParaRPr lang="fr-FR" sz="1200" dirty="0"/>
                     </a:p>
                     <a:p>
                       <a:pPr marL="0" marR="0" lvl="0" indent="0" algn="l" defTabSz="1280160" rtl="0" eaLnBrk="1" fontAlgn="auto" latinLnBrk="0" hangingPunct="1">
@@ -9356,17 +9567,18 @@
                         <a:defRPr/>
                       </a:pPr>
                       <a:r>
-                        <a:rPr lang="fr-FR" sz="1200" b="1" dirty="0"/>
+                        <a:rPr lang="fr-FR" sz="1200" dirty="0"/>
                         <a:t>(</a:t>
                       </a:r>
                       <a:r>
-                        <a:rPr lang="fr-FR" sz="1200" b="1" dirty="0" err="1"/>
+                        <a:rPr lang="fr-FR" sz="1200" dirty="0" err="1"/>
                         <a:t>int</a:t>
                       </a:r>
                       <a:r>
-                        <a:rPr lang="fr-FR" sz="1200" b="1" dirty="0"/>
+                        <a:rPr lang="fr-FR" sz="1200" dirty="0"/>
                         <a:t>)</a:t>
                       </a:r>
+                      <a:endParaRPr lang="fr-FR" sz="1200" b="1" dirty="0"/>
                     </a:p>
                   </a:txBody>
                   <a:tcPr/>
@@ -9394,10 +9606,10 @@
                         <a:defRPr/>
                       </a:pPr>
                       <a:r>
-                        <a:rPr lang="fr-FR" sz="1200" b="1" dirty="0" err="1"/>
-                        <a:t>ID_DossierReservation</a:t>
-                      </a:r>
-                      <a:endParaRPr lang="fr-FR" sz="1200" b="1" dirty="0"/>
+                        <a:rPr lang="fr-FR" sz="1200" dirty="0" err="1"/>
+                        <a:t>ID_Dossier</a:t>
+                      </a:r>
+                      <a:endParaRPr lang="fr-FR" sz="1200" dirty="0"/>
                     </a:p>
                     <a:p>
                       <a:pPr marL="0" marR="0" lvl="0" indent="0" algn="l" defTabSz="1280160" rtl="0" eaLnBrk="1" fontAlgn="auto" latinLnBrk="0" hangingPunct="1">
@@ -9418,17 +9630,18 @@
                         <a:defRPr/>
                       </a:pPr>
                       <a:r>
-                        <a:rPr lang="fr-FR" sz="1200" b="1" dirty="0"/>
+                        <a:rPr lang="fr-FR" sz="1200" dirty="0"/>
                         <a:t>(</a:t>
                       </a:r>
                       <a:r>
-                        <a:rPr lang="fr-FR" sz="1200" b="1" dirty="0" err="1"/>
+                        <a:rPr lang="fr-FR" sz="1200" dirty="0" err="1"/>
                         <a:t>int</a:t>
                       </a:r>
                       <a:r>
-                        <a:rPr lang="fr-FR" sz="1200" b="1" dirty="0"/>
+                        <a:rPr lang="fr-FR" sz="1200" dirty="0"/>
                         <a:t>)</a:t>
                       </a:r>
+                      <a:endParaRPr lang="fr-FR" sz="1200" b="1" dirty="0"/>
                     </a:p>
                   </a:txBody>
                   <a:tcPr/>
@@ -9445,17 +9658,34 @@
                     <a:bodyPr/>
                     <a:lstStyle/>
                     <a:p>
-                      <a:endParaRPr lang="fr-FR" sz="1200" dirty="0"/>
-                    </a:p>
-                  </a:txBody>
-                  <a:tcPr/>
-                </a:tc>
-                <a:tc>
-                  <a:txBody>
-                    <a:bodyPr/>
-                    <a:lstStyle/>
-                    <a:p>
-                      <a:endParaRPr lang="fr-FR" sz="1200" dirty="0"/>
+                      <a:pPr algn="ctr"/>
+                      <a:r>
+                        <a:rPr lang="fr-FR" sz="1400" b="1" dirty="0">
+                          <a:solidFill>
+                            <a:srgbClr val="C00000"/>
+                          </a:solidFill>
+                        </a:rPr>
+                        <a:t>FK</a:t>
+                      </a:r>
+                    </a:p>
+                  </a:txBody>
+                  <a:tcPr/>
+                </a:tc>
+                <a:tc>
+                  <a:txBody>
+                    <a:bodyPr/>
+                    <a:lstStyle/>
+                    <a:p>
+                      <a:pPr algn="ctr"/>
+                      <a:r>
+                        <a:rPr lang="fr-FR" sz="1400" b="1" dirty="0">
+                          <a:solidFill>
+                            <a:srgbClr val="C00000"/>
+                          </a:solidFill>
+                        </a:rPr>
+                        <a:t>FK</a:t>
+                      </a:r>
+                      <a:endParaRPr lang="fr-FR" sz="1400" dirty="0"/>
                     </a:p>
                   </a:txBody>
                   <a:tcPr/>
@@ -9470,6 +9700,833 @@
           </a:graphicData>
         </a:graphic>
       </p:graphicFrame>
+      <p:sp>
+        <p:nvSpPr>
+          <p:cNvPr id="2" name="Triangle isocèle 1">
+            <a:extLst>
+              <a:ext uri="{FF2B5EF4-FFF2-40B4-BE49-F238E27FC236}">
+                <a16:creationId xmlns:a16="http://schemas.microsoft.com/office/drawing/2014/main" id="{F0159EB4-53F1-416A-95A3-0440DC5EA311}"/>
+              </a:ext>
+            </a:extLst>
+          </p:cNvPr>
+          <p:cNvSpPr/>
+          <p:nvPr/>
+        </p:nvSpPr>
+        <p:spPr>
+          <a:xfrm>
+            <a:off x="177891" y="4303743"/>
+            <a:ext cx="385932" cy="418128"/>
+          </a:xfrm>
+          <a:prstGeom prst="triangle">
+            <a:avLst/>
+          </a:prstGeom>
+        </p:spPr>
+        <p:style>
+          <a:lnRef idx="1">
+            <a:schemeClr val="accent2"/>
+          </a:lnRef>
+          <a:fillRef idx="2">
+            <a:schemeClr val="accent2"/>
+          </a:fillRef>
+          <a:effectRef idx="1">
+            <a:schemeClr val="accent2"/>
+          </a:effectRef>
+          <a:fontRef idx="minor">
+            <a:schemeClr val="dk1"/>
+          </a:fontRef>
+        </p:style>
+        <p:txBody>
+          <a:bodyPr rtlCol="0" anchor="ctr"/>
+          <a:lstStyle/>
+          <a:p>
+            <a:pPr algn="ctr"/>
+            <a:r>
+              <a:rPr lang="fr-FR" dirty="0">
+                <a:ln w="0"/>
+                <a:solidFill>
+                  <a:schemeClr val="tx1"/>
+                </a:solidFill>
+                <a:effectLst>
+                  <a:outerShdw blurRad="38100" dist="19050" dir="2700000" algn="tl" rotWithShape="0">
+                    <a:schemeClr val="dk1">
+                      <a:alpha val="40000"/>
+                    </a:schemeClr>
+                  </a:outerShdw>
+                </a:effectLst>
+              </a:rPr>
+              <a:t>1</a:t>
+            </a:r>
+            <a:endParaRPr lang="fr-FR" dirty="0"/>
+          </a:p>
+        </p:txBody>
+      </p:sp>
+      <p:sp>
+        <p:nvSpPr>
+          <p:cNvPr id="11" name="Triangle isocèle 10">
+            <a:extLst>
+              <a:ext uri="{FF2B5EF4-FFF2-40B4-BE49-F238E27FC236}">
+                <a16:creationId xmlns:a16="http://schemas.microsoft.com/office/drawing/2014/main" id="{88A02EEC-F3FF-4F32-9F60-3F418285F9F9}"/>
+              </a:ext>
+            </a:extLst>
+          </p:cNvPr>
+          <p:cNvSpPr/>
+          <p:nvPr/>
+        </p:nvSpPr>
+        <p:spPr>
+          <a:xfrm>
+            <a:off x="8808609" y="2562942"/>
+            <a:ext cx="385932" cy="418128"/>
+          </a:xfrm>
+          <a:prstGeom prst="triangle">
+            <a:avLst/>
+          </a:prstGeom>
+        </p:spPr>
+        <p:style>
+          <a:lnRef idx="1">
+            <a:schemeClr val="accent2"/>
+          </a:lnRef>
+          <a:fillRef idx="2">
+            <a:schemeClr val="accent2"/>
+          </a:fillRef>
+          <a:effectRef idx="1">
+            <a:schemeClr val="accent2"/>
+          </a:effectRef>
+          <a:fontRef idx="minor">
+            <a:schemeClr val="dk1"/>
+          </a:fontRef>
+        </p:style>
+        <p:txBody>
+          <a:bodyPr rtlCol="0" anchor="ctr"/>
+          <a:lstStyle/>
+          <a:p>
+            <a:pPr algn="ctr"/>
+            <a:r>
+              <a:rPr lang="fr-FR" dirty="0"/>
+              <a:t>2</a:t>
+            </a:r>
+          </a:p>
+        </p:txBody>
+      </p:sp>
+      <p:sp>
+        <p:nvSpPr>
+          <p:cNvPr id="12" name="Triangle isocèle 11">
+            <a:extLst>
+              <a:ext uri="{FF2B5EF4-FFF2-40B4-BE49-F238E27FC236}">
+                <a16:creationId xmlns:a16="http://schemas.microsoft.com/office/drawing/2014/main" id="{7BE91EBF-E304-4BB5-8B8E-58D257E6314E}"/>
+              </a:ext>
+            </a:extLst>
+          </p:cNvPr>
+          <p:cNvSpPr/>
+          <p:nvPr/>
+        </p:nvSpPr>
+        <p:spPr>
+          <a:xfrm>
+            <a:off x="424402" y="7567521"/>
+            <a:ext cx="385932" cy="418128"/>
+          </a:xfrm>
+          <a:prstGeom prst="triangle">
+            <a:avLst/>
+          </a:prstGeom>
+        </p:spPr>
+        <p:style>
+          <a:lnRef idx="1">
+            <a:schemeClr val="accent2"/>
+          </a:lnRef>
+          <a:fillRef idx="2">
+            <a:schemeClr val="accent2"/>
+          </a:fillRef>
+          <a:effectRef idx="1">
+            <a:schemeClr val="accent2"/>
+          </a:effectRef>
+          <a:fontRef idx="minor">
+            <a:schemeClr val="dk1"/>
+          </a:fontRef>
+        </p:style>
+        <p:txBody>
+          <a:bodyPr rtlCol="0" anchor="ctr"/>
+          <a:lstStyle/>
+          <a:p>
+            <a:pPr algn="ctr"/>
+            <a:r>
+              <a:rPr lang="fr-FR" dirty="0">
+                <a:ln w="0"/>
+                <a:solidFill>
+                  <a:schemeClr val="tx1"/>
+                </a:solidFill>
+                <a:effectLst>
+                  <a:outerShdw blurRad="38100" dist="19050" dir="2700000" algn="tl" rotWithShape="0">
+                    <a:schemeClr val="dk1">
+                      <a:alpha val="40000"/>
+                    </a:schemeClr>
+                  </a:outerShdw>
+                </a:effectLst>
+              </a:rPr>
+              <a:t>3</a:t>
+            </a:r>
+            <a:endParaRPr lang="fr-FR" dirty="0"/>
+          </a:p>
+        </p:txBody>
+      </p:sp>
+      <p:sp>
+        <p:nvSpPr>
+          <p:cNvPr id="13" name="Triangle isocèle 12">
+            <a:extLst>
+              <a:ext uri="{FF2B5EF4-FFF2-40B4-BE49-F238E27FC236}">
+                <a16:creationId xmlns:a16="http://schemas.microsoft.com/office/drawing/2014/main" id="{11D1C1D4-BADC-41DC-832E-55DDA0F8F642}"/>
+              </a:ext>
+            </a:extLst>
+          </p:cNvPr>
+          <p:cNvSpPr/>
+          <p:nvPr/>
+        </p:nvSpPr>
+        <p:spPr>
+          <a:xfrm>
+            <a:off x="4904031" y="799275"/>
+            <a:ext cx="385932" cy="418128"/>
+          </a:xfrm>
+          <a:prstGeom prst="triangle">
+            <a:avLst/>
+          </a:prstGeom>
+        </p:spPr>
+        <p:style>
+          <a:lnRef idx="1">
+            <a:schemeClr val="accent2"/>
+          </a:lnRef>
+          <a:fillRef idx="2">
+            <a:schemeClr val="accent2"/>
+          </a:fillRef>
+          <a:effectRef idx="1">
+            <a:schemeClr val="accent2"/>
+          </a:effectRef>
+          <a:fontRef idx="minor">
+            <a:schemeClr val="dk1"/>
+          </a:fontRef>
+        </p:style>
+        <p:txBody>
+          <a:bodyPr rtlCol="0" anchor="ctr"/>
+          <a:lstStyle/>
+          <a:p>
+            <a:pPr algn="ctr"/>
+            <a:r>
+              <a:rPr lang="fr-FR" dirty="0">
+                <a:ln w="0"/>
+                <a:solidFill>
+                  <a:schemeClr val="tx1"/>
+                </a:solidFill>
+                <a:effectLst>
+                  <a:outerShdw blurRad="38100" dist="19050" dir="2700000" algn="tl" rotWithShape="0">
+                    <a:schemeClr val="dk1">
+                      <a:alpha val="40000"/>
+                    </a:schemeClr>
+                  </a:outerShdw>
+                </a:effectLst>
+              </a:rPr>
+              <a:t>4</a:t>
+            </a:r>
+            <a:endParaRPr lang="fr-FR" dirty="0"/>
+          </a:p>
+        </p:txBody>
+      </p:sp>
+      <p:sp>
+        <p:nvSpPr>
+          <p:cNvPr id="14" name="Triangle isocèle 13">
+            <a:extLst>
+              <a:ext uri="{FF2B5EF4-FFF2-40B4-BE49-F238E27FC236}">
+                <a16:creationId xmlns:a16="http://schemas.microsoft.com/office/drawing/2014/main" id="{8E667FBB-0035-48DE-A2F3-CA5CE41CB76E}"/>
+              </a:ext>
+            </a:extLst>
+          </p:cNvPr>
+          <p:cNvSpPr/>
+          <p:nvPr/>
+        </p:nvSpPr>
+        <p:spPr>
+          <a:xfrm>
+            <a:off x="177890" y="2587695"/>
+            <a:ext cx="385932" cy="418128"/>
+          </a:xfrm>
+          <a:prstGeom prst="triangle">
+            <a:avLst/>
+          </a:prstGeom>
+        </p:spPr>
+        <p:style>
+          <a:lnRef idx="1">
+            <a:schemeClr val="accent2"/>
+          </a:lnRef>
+          <a:fillRef idx="2">
+            <a:schemeClr val="accent2"/>
+          </a:fillRef>
+          <a:effectRef idx="1">
+            <a:schemeClr val="accent2"/>
+          </a:effectRef>
+          <a:fontRef idx="minor">
+            <a:schemeClr val="dk1"/>
+          </a:fontRef>
+        </p:style>
+        <p:txBody>
+          <a:bodyPr rtlCol="0" anchor="ctr"/>
+          <a:lstStyle/>
+          <a:p>
+            <a:pPr algn="ctr"/>
+            <a:r>
+              <a:rPr lang="fr-FR" dirty="0">
+                <a:ln w="0"/>
+                <a:solidFill>
+                  <a:schemeClr val="tx1"/>
+                </a:solidFill>
+                <a:effectLst>
+                  <a:outerShdw blurRad="38100" dist="19050" dir="2700000" algn="tl" rotWithShape="0">
+                    <a:schemeClr val="dk1">
+                      <a:alpha val="40000"/>
+                    </a:schemeClr>
+                  </a:outerShdw>
+                </a:effectLst>
+              </a:rPr>
+              <a:t>5</a:t>
+            </a:r>
+            <a:endParaRPr lang="fr-FR" dirty="0"/>
+          </a:p>
+        </p:txBody>
+      </p:sp>
+      <p:sp>
+        <p:nvSpPr>
+          <p:cNvPr id="15" name="Triangle isocèle 14">
+            <a:extLst>
+              <a:ext uri="{FF2B5EF4-FFF2-40B4-BE49-F238E27FC236}">
+                <a16:creationId xmlns:a16="http://schemas.microsoft.com/office/drawing/2014/main" id="{738CB8D7-9069-4DB4-B2F3-A921D167E4FC}"/>
+              </a:ext>
+            </a:extLst>
+          </p:cNvPr>
+          <p:cNvSpPr/>
+          <p:nvPr/>
+        </p:nvSpPr>
+        <p:spPr>
+          <a:xfrm>
+            <a:off x="4740620" y="4259542"/>
+            <a:ext cx="385932" cy="418128"/>
+          </a:xfrm>
+          <a:prstGeom prst="triangle">
+            <a:avLst/>
+          </a:prstGeom>
+        </p:spPr>
+        <p:style>
+          <a:lnRef idx="1">
+            <a:schemeClr val="accent2"/>
+          </a:lnRef>
+          <a:fillRef idx="2">
+            <a:schemeClr val="accent2"/>
+          </a:fillRef>
+          <a:effectRef idx="1">
+            <a:schemeClr val="accent2"/>
+          </a:effectRef>
+          <a:fontRef idx="minor">
+            <a:schemeClr val="dk1"/>
+          </a:fontRef>
+        </p:style>
+        <p:txBody>
+          <a:bodyPr rtlCol="0" anchor="ctr"/>
+          <a:lstStyle/>
+          <a:p>
+            <a:pPr algn="ctr"/>
+            <a:r>
+              <a:rPr lang="fr-FR" dirty="0">
+                <a:ln w="0"/>
+                <a:solidFill>
+                  <a:schemeClr val="tx1"/>
+                </a:solidFill>
+                <a:effectLst>
+                  <a:outerShdw blurRad="38100" dist="19050" dir="2700000" algn="tl" rotWithShape="0">
+                    <a:schemeClr val="dk1">
+                      <a:alpha val="40000"/>
+                    </a:schemeClr>
+                  </a:outerShdw>
+                </a:effectLst>
+              </a:rPr>
+              <a:t>6</a:t>
+            </a:r>
+            <a:endParaRPr lang="fr-FR" dirty="0"/>
+          </a:p>
+        </p:txBody>
+      </p:sp>
+      <p:sp>
+        <p:nvSpPr>
+          <p:cNvPr id="16" name="Triangle isocèle 15">
+            <a:extLst>
+              <a:ext uri="{FF2B5EF4-FFF2-40B4-BE49-F238E27FC236}">
+                <a16:creationId xmlns:a16="http://schemas.microsoft.com/office/drawing/2014/main" id="{9D6DAC15-E674-4D59-B312-B10487FFA660}"/>
+              </a:ext>
+            </a:extLst>
+          </p:cNvPr>
+          <p:cNvSpPr/>
+          <p:nvPr/>
+        </p:nvSpPr>
+        <p:spPr>
+          <a:xfrm>
+            <a:off x="254370" y="6019791"/>
+            <a:ext cx="385932" cy="418128"/>
+          </a:xfrm>
+          <a:prstGeom prst="triangle">
+            <a:avLst/>
+          </a:prstGeom>
+        </p:spPr>
+        <p:style>
+          <a:lnRef idx="1">
+            <a:schemeClr val="accent2"/>
+          </a:lnRef>
+          <a:fillRef idx="2">
+            <a:schemeClr val="accent2"/>
+          </a:fillRef>
+          <a:effectRef idx="1">
+            <a:schemeClr val="accent2"/>
+          </a:effectRef>
+          <a:fontRef idx="minor">
+            <a:schemeClr val="dk1"/>
+          </a:fontRef>
+        </p:style>
+        <p:txBody>
+          <a:bodyPr rtlCol="0" anchor="ctr"/>
+          <a:lstStyle/>
+          <a:p>
+            <a:pPr algn="ctr"/>
+            <a:r>
+              <a:rPr lang="fr-FR" dirty="0">
+                <a:ln w="0"/>
+                <a:solidFill>
+                  <a:schemeClr val="tx1"/>
+                </a:solidFill>
+                <a:effectLst>
+                  <a:outerShdw blurRad="38100" dist="19050" dir="2700000" algn="tl" rotWithShape="0">
+                    <a:schemeClr val="dk1">
+                      <a:alpha val="40000"/>
+                    </a:schemeClr>
+                  </a:outerShdw>
+                </a:effectLst>
+              </a:rPr>
+              <a:t>7</a:t>
+            </a:r>
+            <a:endParaRPr lang="fr-FR" dirty="0"/>
+          </a:p>
+        </p:txBody>
+      </p:sp>
+      <p:sp>
+        <p:nvSpPr>
+          <p:cNvPr id="17" name="Triangle isocèle 16">
+            <a:extLst>
+              <a:ext uri="{FF2B5EF4-FFF2-40B4-BE49-F238E27FC236}">
+                <a16:creationId xmlns:a16="http://schemas.microsoft.com/office/drawing/2014/main" id="{D9BCAEFB-EF8E-4587-AC07-1CCACF2FC9DD}"/>
+              </a:ext>
+            </a:extLst>
+          </p:cNvPr>
+          <p:cNvSpPr/>
+          <p:nvPr/>
+        </p:nvSpPr>
+        <p:spPr>
+          <a:xfrm>
+            <a:off x="3971261" y="5163646"/>
+            <a:ext cx="385932" cy="418128"/>
+          </a:xfrm>
+          <a:prstGeom prst="triangle">
+            <a:avLst/>
+          </a:prstGeom>
+        </p:spPr>
+        <p:style>
+          <a:lnRef idx="1">
+            <a:schemeClr val="accent6"/>
+          </a:lnRef>
+          <a:fillRef idx="2">
+            <a:schemeClr val="accent6"/>
+          </a:fillRef>
+          <a:effectRef idx="1">
+            <a:schemeClr val="accent6"/>
+          </a:effectRef>
+          <a:fontRef idx="minor">
+            <a:schemeClr val="dk1"/>
+          </a:fontRef>
+        </p:style>
+        <p:txBody>
+          <a:bodyPr rtlCol="0" anchor="ctr"/>
+          <a:lstStyle/>
+          <a:p>
+            <a:pPr algn="ctr"/>
+            <a:r>
+              <a:rPr lang="fr-FR" dirty="0">
+                <a:ln w="0"/>
+                <a:solidFill>
+                  <a:schemeClr val="tx1"/>
+                </a:solidFill>
+                <a:effectLst>
+                  <a:outerShdw blurRad="38100" dist="19050" dir="2700000" algn="tl" rotWithShape="0">
+                    <a:schemeClr val="dk1">
+                      <a:alpha val="40000"/>
+                    </a:schemeClr>
+                  </a:outerShdw>
+                </a:effectLst>
+              </a:rPr>
+              <a:t>7</a:t>
+            </a:r>
+            <a:endParaRPr lang="fr-FR" dirty="0"/>
+          </a:p>
+        </p:txBody>
+      </p:sp>
+      <p:sp>
+        <p:nvSpPr>
+          <p:cNvPr id="18" name="Triangle isocèle 17">
+            <a:extLst>
+              <a:ext uri="{FF2B5EF4-FFF2-40B4-BE49-F238E27FC236}">
+                <a16:creationId xmlns:a16="http://schemas.microsoft.com/office/drawing/2014/main" id="{B17CF252-2A9E-4D8A-B133-4B8CA824F9D4}"/>
+              </a:ext>
+            </a:extLst>
+          </p:cNvPr>
+          <p:cNvSpPr/>
+          <p:nvPr/>
+        </p:nvSpPr>
+        <p:spPr>
+          <a:xfrm>
+            <a:off x="11856006" y="3718180"/>
+            <a:ext cx="385932" cy="418128"/>
+          </a:xfrm>
+          <a:prstGeom prst="triangle">
+            <a:avLst/>
+          </a:prstGeom>
+        </p:spPr>
+        <p:style>
+          <a:lnRef idx="1">
+            <a:schemeClr val="accent6"/>
+          </a:lnRef>
+          <a:fillRef idx="2">
+            <a:schemeClr val="accent6"/>
+          </a:fillRef>
+          <a:effectRef idx="1">
+            <a:schemeClr val="accent6"/>
+          </a:effectRef>
+          <a:fontRef idx="minor">
+            <a:schemeClr val="dk1"/>
+          </a:fontRef>
+        </p:style>
+        <p:txBody>
+          <a:bodyPr rtlCol="0" anchor="ctr"/>
+          <a:lstStyle/>
+          <a:p>
+            <a:pPr algn="ctr"/>
+            <a:r>
+              <a:rPr lang="fr-FR" dirty="0">
+                <a:ln w="0"/>
+                <a:solidFill>
+                  <a:schemeClr val="tx1"/>
+                </a:solidFill>
+                <a:effectLst>
+                  <a:outerShdw blurRad="38100" dist="19050" dir="2700000" algn="tl" rotWithShape="0">
+                    <a:schemeClr val="dk1">
+                      <a:alpha val="40000"/>
+                    </a:schemeClr>
+                  </a:outerShdw>
+                </a:effectLst>
+              </a:rPr>
+              <a:t>6</a:t>
+            </a:r>
+            <a:endParaRPr lang="fr-FR" dirty="0"/>
+          </a:p>
+        </p:txBody>
+      </p:sp>
+      <p:sp>
+        <p:nvSpPr>
+          <p:cNvPr id="19" name="Triangle isocèle 18">
+            <a:extLst>
+              <a:ext uri="{FF2B5EF4-FFF2-40B4-BE49-F238E27FC236}">
+                <a16:creationId xmlns:a16="http://schemas.microsoft.com/office/drawing/2014/main" id="{E733AB75-4AF3-4F8F-AEAB-D998301DAD3B}"/>
+              </a:ext>
+            </a:extLst>
+          </p:cNvPr>
+          <p:cNvSpPr/>
+          <p:nvPr/>
+        </p:nvSpPr>
+        <p:spPr>
+          <a:xfrm>
+            <a:off x="11323918" y="9086093"/>
+            <a:ext cx="385932" cy="418128"/>
+          </a:xfrm>
+          <a:prstGeom prst="triangle">
+            <a:avLst/>
+          </a:prstGeom>
+        </p:spPr>
+        <p:style>
+          <a:lnRef idx="1">
+            <a:schemeClr val="accent6"/>
+          </a:lnRef>
+          <a:fillRef idx="2">
+            <a:schemeClr val="accent6"/>
+          </a:fillRef>
+          <a:effectRef idx="1">
+            <a:schemeClr val="accent6"/>
+          </a:effectRef>
+          <a:fontRef idx="minor">
+            <a:schemeClr val="dk1"/>
+          </a:fontRef>
+        </p:style>
+        <p:txBody>
+          <a:bodyPr rtlCol="0" anchor="ctr"/>
+          <a:lstStyle/>
+          <a:p>
+            <a:pPr algn="ctr"/>
+            <a:r>
+              <a:rPr lang="fr-FR" dirty="0">
+                <a:ln w="0"/>
+                <a:solidFill>
+                  <a:schemeClr val="tx1"/>
+                </a:solidFill>
+                <a:effectLst>
+                  <a:outerShdw blurRad="38100" dist="19050" dir="2700000" algn="tl" rotWithShape="0">
+                    <a:schemeClr val="dk1">
+                      <a:alpha val="40000"/>
+                    </a:schemeClr>
+                  </a:outerShdw>
+                </a:effectLst>
+              </a:rPr>
+              <a:t>5</a:t>
+            </a:r>
+            <a:endParaRPr lang="fr-FR" dirty="0"/>
+          </a:p>
+        </p:txBody>
+      </p:sp>
+      <p:sp>
+        <p:nvSpPr>
+          <p:cNvPr id="20" name="Triangle isocèle 19">
+            <a:extLst>
+              <a:ext uri="{FF2B5EF4-FFF2-40B4-BE49-F238E27FC236}">
+                <a16:creationId xmlns:a16="http://schemas.microsoft.com/office/drawing/2014/main" id="{041C6E06-5331-476B-A1F5-381578B868E5}"/>
+              </a:ext>
+            </a:extLst>
+          </p:cNvPr>
+          <p:cNvSpPr/>
+          <p:nvPr/>
+        </p:nvSpPr>
+        <p:spPr>
+          <a:xfrm>
+            <a:off x="8697401" y="1892789"/>
+            <a:ext cx="385932" cy="418128"/>
+          </a:xfrm>
+          <a:prstGeom prst="triangle">
+            <a:avLst/>
+          </a:prstGeom>
+        </p:spPr>
+        <p:style>
+          <a:lnRef idx="1">
+            <a:schemeClr val="accent6"/>
+          </a:lnRef>
+          <a:fillRef idx="2">
+            <a:schemeClr val="accent6"/>
+          </a:fillRef>
+          <a:effectRef idx="1">
+            <a:schemeClr val="accent6"/>
+          </a:effectRef>
+          <a:fontRef idx="minor">
+            <a:schemeClr val="dk1"/>
+          </a:fontRef>
+        </p:style>
+        <p:txBody>
+          <a:bodyPr rtlCol="0" anchor="ctr"/>
+          <a:lstStyle/>
+          <a:p>
+            <a:pPr algn="ctr"/>
+            <a:r>
+              <a:rPr lang="fr-FR" dirty="0">
+                <a:ln w="0"/>
+                <a:solidFill>
+                  <a:schemeClr val="tx1"/>
+                </a:solidFill>
+                <a:effectLst>
+                  <a:outerShdw blurRad="38100" dist="19050" dir="2700000" algn="tl" rotWithShape="0">
+                    <a:schemeClr val="dk1">
+                      <a:alpha val="40000"/>
+                    </a:schemeClr>
+                  </a:outerShdw>
+                </a:effectLst>
+              </a:rPr>
+              <a:t>4</a:t>
+            </a:r>
+            <a:endParaRPr lang="fr-FR" dirty="0"/>
+          </a:p>
+        </p:txBody>
+      </p:sp>
+      <p:sp>
+        <p:nvSpPr>
+          <p:cNvPr id="21" name="Triangle isocèle 20">
+            <a:extLst>
+              <a:ext uri="{FF2B5EF4-FFF2-40B4-BE49-F238E27FC236}">
+                <a16:creationId xmlns:a16="http://schemas.microsoft.com/office/drawing/2014/main" id="{19BCD796-79D1-4957-B21D-CCE848B81695}"/>
+              </a:ext>
+            </a:extLst>
+          </p:cNvPr>
+          <p:cNvSpPr/>
+          <p:nvPr/>
+        </p:nvSpPr>
+        <p:spPr>
+          <a:xfrm>
+            <a:off x="8334866" y="3668219"/>
+            <a:ext cx="385932" cy="418128"/>
+          </a:xfrm>
+          <a:prstGeom prst="triangle">
+            <a:avLst/>
+          </a:prstGeom>
+        </p:spPr>
+        <p:style>
+          <a:lnRef idx="1">
+            <a:schemeClr val="accent6"/>
+          </a:lnRef>
+          <a:fillRef idx="2">
+            <a:schemeClr val="accent6"/>
+          </a:fillRef>
+          <a:effectRef idx="1">
+            <a:schemeClr val="accent6"/>
+          </a:effectRef>
+          <a:fontRef idx="minor">
+            <a:schemeClr val="dk1"/>
+          </a:fontRef>
+        </p:style>
+        <p:txBody>
+          <a:bodyPr rtlCol="0" anchor="ctr"/>
+          <a:lstStyle/>
+          <a:p>
+            <a:pPr algn="ctr"/>
+            <a:r>
+              <a:rPr lang="fr-FR" dirty="0">
+                <a:ln w="0"/>
+                <a:solidFill>
+                  <a:schemeClr val="tx1"/>
+                </a:solidFill>
+                <a:effectLst>
+                  <a:outerShdw blurRad="38100" dist="19050" dir="2700000" algn="tl" rotWithShape="0">
+                    <a:schemeClr val="dk1">
+                      <a:alpha val="40000"/>
+                    </a:schemeClr>
+                  </a:outerShdw>
+                </a:effectLst>
+              </a:rPr>
+              <a:t>3</a:t>
+            </a:r>
+            <a:endParaRPr lang="fr-FR" dirty="0"/>
+          </a:p>
+        </p:txBody>
+      </p:sp>
+      <p:sp>
+        <p:nvSpPr>
+          <p:cNvPr id="22" name="Triangle isocèle 21">
+            <a:extLst>
+              <a:ext uri="{FF2B5EF4-FFF2-40B4-BE49-F238E27FC236}">
+                <a16:creationId xmlns:a16="http://schemas.microsoft.com/office/drawing/2014/main" id="{2443DEB9-EBDD-4C29-B38A-805CA2BA0436}"/>
+              </a:ext>
+            </a:extLst>
+          </p:cNvPr>
+          <p:cNvSpPr/>
+          <p:nvPr/>
+        </p:nvSpPr>
+        <p:spPr>
+          <a:xfrm>
+            <a:off x="11614706" y="5414404"/>
+            <a:ext cx="385932" cy="418128"/>
+          </a:xfrm>
+          <a:prstGeom prst="triangle">
+            <a:avLst/>
+          </a:prstGeom>
+        </p:spPr>
+        <p:style>
+          <a:lnRef idx="1">
+            <a:schemeClr val="accent6"/>
+          </a:lnRef>
+          <a:fillRef idx="2">
+            <a:schemeClr val="accent6"/>
+          </a:fillRef>
+          <a:effectRef idx="1">
+            <a:schemeClr val="accent6"/>
+          </a:effectRef>
+          <a:fontRef idx="minor">
+            <a:schemeClr val="dk1"/>
+          </a:fontRef>
+        </p:style>
+        <p:txBody>
+          <a:bodyPr rtlCol="0" anchor="ctr"/>
+          <a:lstStyle/>
+          <a:p>
+            <a:pPr algn="ctr"/>
+            <a:r>
+              <a:rPr lang="fr-FR" dirty="0">
+                <a:ln w="0"/>
+                <a:solidFill>
+                  <a:schemeClr val="tx1"/>
+                </a:solidFill>
+                <a:effectLst>
+                  <a:outerShdw blurRad="38100" dist="19050" dir="2700000" algn="tl" rotWithShape="0">
+                    <a:schemeClr val="dk1">
+                      <a:alpha val="40000"/>
+                    </a:schemeClr>
+                  </a:outerShdw>
+                </a:effectLst>
+              </a:rPr>
+              <a:t>2</a:t>
+            </a:r>
+            <a:endParaRPr lang="fr-FR" dirty="0"/>
+          </a:p>
+        </p:txBody>
+      </p:sp>
+      <p:sp>
+        <p:nvSpPr>
+          <p:cNvPr id="23" name="Triangle isocèle 22">
+            <a:extLst>
+              <a:ext uri="{FF2B5EF4-FFF2-40B4-BE49-F238E27FC236}">
+                <a16:creationId xmlns:a16="http://schemas.microsoft.com/office/drawing/2014/main" id="{F73BD538-E017-4E61-9A39-A065FFAEBDF7}"/>
+              </a:ext>
+            </a:extLst>
+          </p:cNvPr>
+          <p:cNvSpPr/>
+          <p:nvPr/>
+        </p:nvSpPr>
+        <p:spPr>
+          <a:xfrm>
+            <a:off x="11516885" y="7202111"/>
+            <a:ext cx="385932" cy="418128"/>
+          </a:xfrm>
+          <a:prstGeom prst="triangle">
+            <a:avLst/>
+          </a:prstGeom>
+        </p:spPr>
+        <p:style>
+          <a:lnRef idx="1">
+            <a:schemeClr val="accent6"/>
+          </a:lnRef>
+          <a:fillRef idx="2">
+            <a:schemeClr val="accent6"/>
+          </a:fillRef>
+          <a:effectRef idx="1">
+            <a:schemeClr val="accent6"/>
+          </a:effectRef>
+          <a:fontRef idx="minor">
+            <a:schemeClr val="dk1"/>
+          </a:fontRef>
+        </p:style>
+        <p:txBody>
+          <a:bodyPr rtlCol="0" anchor="ctr"/>
+          <a:lstStyle/>
+          <a:p>
+            <a:pPr algn="ctr"/>
+            <a:r>
+              <a:rPr lang="fr-FR" dirty="0">
+                <a:ln w="0"/>
+                <a:solidFill>
+                  <a:schemeClr val="tx1"/>
+                </a:solidFill>
+                <a:effectLst>
+                  <a:outerShdw blurRad="38100" dist="19050" dir="2700000" algn="tl" rotWithShape="0">
+                    <a:schemeClr val="dk1">
+                      <a:alpha val="40000"/>
+                    </a:schemeClr>
+                  </a:outerShdw>
+                </a:effectLst>
+              </a:rPr>
+              <a:t>1</a:t>
+            </a:r>
+            <a:endParaRPr lang="fr-FR" dirty="0"/>
+          </a:p>
+        </p:txBody>
+      </p:sp>
     </p:spTree>
     <p:extLst>
       <p:ext uri="{BB962C8B-B14F-4D97-AF65-F5344CB8AC3E}">

</xml_diff>